<commit_message>
Added image filler to ppt
</commit_message>
<xml_diff>
--- a/to_delete/output.pptx
+++ b/to_delete/output.pptx
@@ -543,321 +543,43 @@
     </pc:docChg>
   </pc:docChgLst>
   <pc:docChgLst>
-    <pc:chgData name="Rasmus Thunberg" userId="af205901-3309-4d5c-9e14-c9ebbb4fdd00" providerId="ADAL" clId="{EC0F497D-4F42-4742-AD86-5855458E6A04}"/>
-    <pc:docChg chg="undo redo custSel mod addSld modSld modMainMaster">
-      <pc:chgData name="Rasmus Thunberg" userId="af205901-3309-4d5c-9e14-c9ebbb4fdd00" providerId="ADAL" clId="{EC0F497D-4F42-4742-AD86-5855458E6A04}" dt="2023-10-03T09:32:37.149" v="480" actId="20577"/>
+    <pc:chgData name="Julian Soeltzer" userId="S::2677817@tcs.com::39542089-ba8e-403e-b2a2-6c80f71f2896" providerId="AD" clId="Web-{9CD95C4B-7DB1-4213-B09C-AB9A6D36F708}"/>
+    <pc:docChg chg="addSld modSld">
+      <pc:chgData name="Julian Soeltzer" userId="S::2677817@tcs.com::39542089-ba8e-403e-b2a2-6c80f71f2896" providerId="AD" clId="Web-{9CD95C4B-7DB1-4213-B09C-AB9A6D36F708}" dt="2023-10-04T13:27:46.438" v="56" actId="20577"/>
       <pc:docMkLst>
         <pc:docMk/>
       </pc:docMkLst>
-      <pc:sldChg chg="addSp delSp modSp mod">
-        <pc:chgData name="Rasmus Thunberg" userId="af205901-3309-4d5c-9e14-c9ebbb4fdd00" providerId="ADAL" clId="{EC0F497D-4F42-4742-AD86-5855458E6A04}" dt="2023-10-03T07:07:49.721" v="204" actId="20577"/>
+      <pc:sldChg chg="addSp modSp add replId">
+        <pc:chgData name="Julian Soeltzer" userId="S::2677817@tcs.com::39542089-ba8e-403e-b2a2-6c80f71f2896" providerId="AD" clId="Web-{9CD95C4B-7DB1-4213-B09C-AB9A6D36F708}" dt="2023-10-04T13:27:46.438" v="56" actId="20577"/>
         <pc:sldMkLst>
           <pc:docMk/>
-          <pc:sldMk cId="1182490399" sldId="256"/>
-        </pc:sldMkLst>
-        <pc:spChg chg="add mod">
-          <ac:chgData name="Rasmus Thunberg" userId="af205901-3309-4d5c-9e14-c9ebbb4fdd00" providerId="ADAL" clId="{EC0F497D-4F42-4742-AD86-5855458E6A04}" dt="2023-10-03T07:00:25.037" v="113" actId="14100"/>
-          <ac:spMkLst>
-            <pc:docMk/>
-            <pc:sldMk cId="1182490399" sldId="256"/>
-            <ac:spMk id="2" creationId="{9B542F04-3245-83B2-1CF1-EF062922034F}"/>
-          </ac:spMkLst>
-        </pc:spChg>
-        <pc:spChg chg="add del mod">
-          <ac:chgData name="Rasmus Thunberg" userId="af205901-3309-4d5c-9e14-c9ebbb4fdd00" providerId="ADAL" clId="{EC0F497D-4F42-4742-AD86-5855458E6A04}" dt="2023-10-03T07:00:49.868" v="120" actId="1076"/>
-          <ac:spMkLst>
-            <pc:docMk/>
-            <pc:sldMk cId="1182490399" sldId="256"/>
-            <ac:spMk id="3" creationId="{68188345-DAD2-0F54-EC92-CE1E36B55603}"/>
-          </ac:spMkLst>
-        </pc:spChg>
-        <pc:spChg chg="add mod">
-          <ac:chgData name="Rasmus Thunberg" userId="af205901-3309-4d5c-9e14-c9ebbb4fdd00" providerId="ADAL" clId="{EC0F497D-4F42-4742-AD86-5855458E6A04}" dt="2023-10-03T07:05:47.027" v="161" actId="20577"/>
-          <ac:spMkLst>
-            <pc:docMk/>
-            <pc:sldMk cId="1182490399" sldId="256"/>
-            <ac:spMk id="4" creationId="{DA3F3E79-8D77-FC87-A734-4E09595CB5DF}"/>
-          </ac:spMkLst>
-        </pc:spChg>
-        <pc:spChg chg="mod">
-          <ac:chgData name="Rasmus Thunberg" userId="af205901-3309-4d5c-9e14-c9ebbb4fdd00" providerId="ADAL" clId="{EC0F497D-4F42-4742-AD86-5855458E6A04}" dt="2023-10-03T06:45:13.963" v="8" actId="1076"/>
-          <ac:spMkLst>
-            <pc:docMk/>
-            <pc:sldMk cId="1182490399" sldId="256"/>
-            <ac:spMk id="10" creationId="{4E09E2CA-4D4F-0D16-CB68-E9BD517048D7}"/>
-          </ac:spMkLst>
-        </pc:spChg>
-        <pc:spChg chg="mod">
-          <ac:chgData name="Rasmus Thunberg" userId="af205901-3309-4d5c-9e14-c9ebbb4fdd00" providerId="ADAL" clId="{EC0F497D-4F42-4742-AD86-5855458E6A04}" dt="2023-10-03T06:45:18.833" v="9" actId="1076"/>
-          <ac:spMkLst>
-            <pc:docMk/>
-            <pc:sldMk cId="1182490399" sldId="256"/>
-            <ac:spMk id="12" creationId="{0064FD19-4BA5-5018-829D-9C6CA388109E}"/>
-          </ac:spMkLst>
-        </pc:spChg>
-        <pc:spChg chg="del">
-          <ac:chgData name="Rasmus Thunberg" userId="af205901-3309-4d5c-9e14-c9ebbb4fdd00" providerId="ADAL" clId="{EC0F497D-4F42-4742-AD86-5855458E6A04}" dt="2023-10-03T06:44:54.295" v="5" actId="478"/>
-          <ac:spMkLst>
-            <pc:docMk/>
-            <pc:sldMk cId="1182490399" sldId="256"/>
-            <ac:spMk id="13" creationId="{DDB44A97-DB00-159D-EF6E-37320E65CEE0}"/>
-          </ac:spMkLst>
-        </pc:spChg>
-        <pc:spChg chg="del">
-          <ac:chgData name="Rasmus Thunberg" userId="af205901-3309-4d5c-9e14-c9ebbb4fdd00" providerId="ADAL" clId="{EC0F497D-4F42-4742-AD86-5855458E6A04}" dt="2023-10-03T06:45:25.918" v="12" actId="478"/>
-          <ac:spMkLst>
-            <pc:docMk/>
-            <pc:sldMk cId="1182490399" sldId="256"/>
-            <ac:spMk id="15" creationId="{7936962E-73B7-A058-3F95-6F709C28C92E}"/>
-          </ac:spMkLst>
-        </pc:spChg>
-        <pc:spChg chg="del">
-          <ac:chgData name="Rasmus Thunberg" userId="af205901-3309-4d5c-9e14-c9ebbb4fdd00" providerId="ADAL" clId="{EC0F497D-4F42-4742-AD86-5855458E6A04}" dt="2023-10-03T06:45:24.073" v="11" actId="478"/>
-          <ac:spMkLst>
-            <pc:docMk/>
-            <pc:sldMk cId="1182490399" sldId="256"/>
-            <ac:spMk id="16" creationId="{A537BEAB-F929-8A29-12CA-395A0D9E816D}"/>
-          </ac:spMkLst>
-        </pc:spChg>
-        <pc:spChg chg="mod">
-          <ac:chgData name="Rasmus Thunberg" userId="af205901-3309-4d5c-9e14-c9ebbb4fdd00" providerId="ADAL" clId="{EC0F497D-4F42-4742-AD86-5855458E6A04}" dt="2023-10-03T06:46:59.042" v="49" actId="20577"/>
-          <ac:spMkLst>
-            <pc:docMk/>
-            <pc:sldMk cId="1182490399" sldId="256"/>
-            <ac:spMk id="17" creationId="{31623CCC-686B-1904-6B13-DDEA421612E7}"/>
-          </ac:spMkLst>
-        </pc:spChg>
-        <pc:spChg chg="mod">
-          <ac:chgData name="Rasmus Thunberg" userId="af205901-3309-4d5c-9e14-c9ebbb4fdd00" providerId="ADAL" clId="{EC0F497D-4F42-4742-AD86-5855458E6A04}" dt="2023-10-03T06:47:07.068" v="53" actId="5793"/>
-          <ac:spMkLst>
-            <pc:docMk/>
-            <pc:sldMk cId="1182490399" sldId="256"/>
-            <ac:spMk id="18" creationId="{7879456D-AB81-A833-178B-B9AB4C6DCC35}"/>
-          </ac:spMkLst>
-        </pc:spChg>
-        <pc:spChg chg="mod">
-          <ac:chgData name="Rasmus Thunberg" userId="af205901-3309-4d5c-9e14-c9ebbb4fdd00" providerId="ADAL" clId="{EC0F497D-4F42-4742-AD86-5855458E6A04}" dt="2023-10-03T07:07:36.150" v="202" actId="20577"/>
-          <ac:spMkLst>
-            <pc:docMk/>
-            <pc:sldMk cId="1182490399" sldId="256"/>
-            <ac:spMk id="19" creationId="{B7A1A7CF-DE15-625D-629F-040F51846305}"/>
-          </ac:spMkLst>
-        </pc:spChg>
-        <pc:spChg chg="add del mod">
-          <ac:chgData name="Rasmus Thunberg" userId="af205901-3309-4d5c-9e14-c9ebbb4fdd00" providerId="ADAL" clId="{EC0F497D-4F42-4742-AD86-5855458E6A04}" dt="2023-10-03T07:07:46.508" v="203" actId="20577"/>
-          <ac:spMkLst>
-            <pc:docMk/>
-            <pc:sldMk cId="1182490399" sldId="256"/>
-            <ac:spMk id="20" creationId="{809C2245-659B-ED24-E729-362132A9ADCC}"/>
-          </ac:spMkLst>
-        </pc:spChg>
-        <pc:spChg chg="mod">
-          <ac:chgData name="Rasmus Thunberg" userId="af205901-3309-4d5c-9e14-c9ebbb4fdd00" providerId="ADAL" clId="{EC0F497D-4F42-4742-AD86-5855458E6A04}" dt="2023-10-03T07:07:49.721" v="204" actId="20577"/>
-          <ac:spMkLst>
-            <pc:docMk/>
-            <pc:sldMk cId="1182490399" sldId="256"/>
-            <ac:spMk id="21" creationId="{5749F089-D1F1-2D1B-B890-ABB701F7879A}"/>
-          </ac:spMkLst>
-        </pc:spChg>
-        <pc:spChg chg="mod">
-          <ac:chgData name="Rasmus Thunberg" userId="af205901-3309-4d5c-9e14-c9ebbb4fdd00" providerId="ADAL" clId="{EC0F497D-4F42-4742-AD86-5855458E6A04}" dt="2023-10-03T07:00:29.734" v="114" actId="14100"/>
-          <ac:spMkLst>
-            <pc:docMk/>
-            <pc:sldMk cId="1182490399" sldId="256"/>
-            <ac:spMk id="23" creationId="{5FB31F0A-A7FD-2E97-F95B-DF130557DEED}"/>
-          </ac:spMkLst>
-        </pc:spChg>
-        <pc:spChg chg="del">
-          <ac:chgData name="Rasmus Thunberg" userId="af205901-3309-4d5c-9e14-c9ebbb4fdd00" providerId="ADAL" clId="{EC0F497D-4F42-4742-AD86-5855458E6A04}" dt="2023-10-03T07:02:53.742" v="121" actId="478"/>
-          <ac:spMkLst>
-            <pc:docMk/>
-            <pc:sldMk cId="1182490399" sldId="256"/>
-            <ac:spMk id="24" creationId="{79C05BEE-DBAB-2037-0E54-2102ABD3F219}"/>
-          </ac:spMkLst>
-        </pc:spChg>
-        <pc:spChg chg="del">
-          <ac:chgData name="Rasmus Thunberg" userId="af205901-3309-4d5c-9e14-c9ebbb4fdd00" providerId="ADAL" clId="{EC0F497D-4F42-4742-AD86-5855458E6A04}" dt="2023-10-03T07:02:57.827" v="124" actId="478"/>
-          <ac:spMkLst>
-            <pc:docMk/>
-            <pc:sldMk cId="1182490399" sldId="256"/>
-            <ac:spMk id="26" creationId="{7D6C9686-9837-B9D1-2DAE-011A02C9A498}"/>
-          </ac:spMkLst>
-        </pc:spChg>
-        <pc:spChg chg="del">
-          <ac:chgData name="Rasmus Thunberg" userId="af205901-3309-4d5c-9e14-c9ebbb4fdd00" providerId="ADAL" clId="{EC0F497D-4F42-4742-AD86-5855458E6A04}" dt="2023-10-03T07:02:59.696" v="125" actId="478"/>
-          <ac:spMkLst>
-            <pc:docMk/>
-            <pc:sldMk cId="1182490399" sldId="256"/>
-            <ac:spMk id="27" creationId="{0BA099BA-54CA-CFE8-D20B-57C4F5CF6014}"/>
-          </ac:spMkLst>
-        </pc:spChg>
-        <pc:grpChg chg="add mod">
-          <ac:chgData name="Rasmus Thunberg" userId="af205901-3309-4d5c-9e14-c9ebbb4fdd00" providerId="ADAL" clId="{EC0F497D-4F42-4742-AD86-5855458E6A04}" dt="2023-10-03T07:05:52.600" v="162" actId="14100"/>
-          <ac:grpSpMkLst>
-            <pc:docMk/>
-            <pc:sldMk cId="1182490399" sldId="256"/>
-            <ac:grpSpMk id="5" creationId="{C085AD75-9BB6-6DE2-78AD-DAD8A0E4AB77}"/>
-          </ac:grpSpMkLst>
-        </pc:grpChg>
-        <pc:picChg chg="del mod">
-          <ac:chgData name="Rasmus Thunberg" userId="af205901-3309-4d5c-9e14-c9ebbb4fdd00" providerId="ADAL" clId="{EC0F497D-4F42-4742-AD86-5855458E6A04}" dt="2023-10-03T06:44:51.007" v="4" actId="478"/>
-          <ac:picMkLst>
-            <pc:docMk/>
-            <pc:sldMk cId="1182490399" sldId="256"/>
-            <ac:picMk id="2050" creationId="{A19A6442-8A75-EBA6-6FE9-66FED6AB0D0F}"/>
-          </ac:picMkLst>
-        </pc:picChg>
-        <pc:cxnChg chg="mod">
-          <ac:chgData name="Rasmus Thunberg" userId="af205901-3309-4d5c-9e14-c9ebbb4fdd00" providerId="ADAL" clId="{EC0F497D-4F42-4742-AD86-5855458E6A04}" dt="2023-10-03T06:45:07.239" v="7" actId="1076"/>
-          <ac:cxnSpMkLst>
-            <pc:docMk/>
-            <pc:sldMk cId="1182490399" sldId="256"/>
-            <ac:cxnSpMk id="8" creationId="{226E5484-E12C-5EE5-8AC1-54ADF0803C9A}"/>
-          </ac:cxnSpMkLst>
-        </pc:cxnChg>
-      </pc:sldChg>
-      <pc:sldChg chg="modSp add mod">
-        <pc:chgData name="Rasmus Thunberg" userId="af205901-3309-4d5c-9e14-c9ebbb4fdd00" providerId="ADAL" clId="{EC0F497D-4F42-4742-AD86-5855458E6A04}" dt="2023-10-03T09:32:37.149" v="480" actId="20577"/>
-        <pc:sldMkLst>
-          <pc:docMk/>
-          <pc:sldMk cId="1813756110" sldId="257"/>
+          <pc:sldMk cId="2678938229" sldId="258"/>
         </pc:sldMkLst>
         <pc:spChg chg="mod">
-          <ac:chgData name="Rasmus Thunberg" userId="af205901-3309-4d5c-9e14-c9ebbb4fdd00" providerId="ADAL" clId="{EC0F497D-4F42-4742-AD86-5855458E6A04}" dt="2023-10-03T09:30:03.437" v="424" actId="20577"/>
+          <ac:chgData name="Julian Soeltzer" userId="S::2677817@tcs.com::39542089-ba8e-403e-b2a2-6c80f71f2896" providerId="AD" clId="Web-{9CD95C4B-7DB1-4213-B09C-AB9A6D36F708}" dt="2023-10-04T13:27:46.438" v="56" actId="20577"/>
           <ac:spMkLst>
             <pc:docMk/>
-            <pc:sldMk cId="1813756110" sldId="257"/>
-            <ac:spMk id="2" creationId="{9B542F04-3245-83B2-1CF1-EF062922034F}"/>
-          </ac:spMkLst>
-        </pc:spChg>
-        <pc:spChg chg="mod">
-          <ac:chgData name="Rasmus Thunberg" userId="af205901-3309-4d5c-9e14-c9ebbb4fdd00" providerId="ADAL" clId="{EC0F497D-4F42-4742-AD86-5855458E6A04}" dt="2023-10-03T09:30:53.898" v="438" actId="20577"/>
-          <ac:spMkLst>
-            <pc:docMk/>
-            <pc:sldMk cId="1813756110" sldId="257"/>
-            <ac:spMk id="3" creationId="{68188345-DAD2-0F54-EC92-CE1E36B55603}"/>
-          </ac:spMkLst>
-        </pc:spChg>
-        <pc:spChg chg="mod">
-          <ac:chgData name="Rasmus Thunberg" userId="af205901-3309-4d5c-9e14-c9ebbb4fdd00" providerId="ADAL" clId="{EC0F497D-4F42-4742-AD86-5855458E6A04}" dt="2023-10-03T09:32:23.345" v="476" actId="20577"/>
-          <ac:spMkLst>
-            <pc:docMk/>
-            <pc:sldMk cId="1813756110" sldId="257"/>
-            <ac:spMk id="4" creationId="{DA3F3E79-8D77-FC87-A734-4E09595CB5DF}"/>
-          </ac:spMkLst>
-        </pc:spChg>
-        <pc:spChg chg="mod">
-          <ac:chgData name="Rasmus Thunberg" userId="af205901-3309-4d5c-9e14-c9ebbb4fdd00" providerId="ADAL" clId="{EC0F497D-4F42-4742-AD86-5855458E6A04}" dt="2023-10-03T09:29:04.695" v="408" actId="1076"/>
-          <ac:spMkLst>
-            <pc:docMk/>
-            <pc:sldMk cId="1813756110" sldId="257"/>
-            <ac:spMk id="10" creationId="{4E09E2CA-4D4F-0D16-CB68-E9BD517048D7}"/>
-          </ac:spMkLst>
-        </pc:spChg>
-        <pc:spChg chg="mod">
-          <ac:chgData name="Rasmus Thunberg" userId="af205901-3309-4d5c-9e14-c9ebbb4fdd00" providerId="ADAL" clId="{EC0F497D-4F42-4742-AD86-5855458E6A04}" dt="2023-10-03T09:29:00.490" v="407" actId="1076"/>
-          <ac:spMkLst>
-            <pc:docMk/>
-            <pc:sldMk cId="1813756110" sldId="257"/>
+            <pc:sldMk cId="2678938229" sldId="258"/>
             <ac:spMk id="11" creationId="{1BD89980-6D7F-C735-5105-AAB6DBBEFC76}"/>
           </ac:spMkLst>
         </pc:spChg>
         <pc:spChg chg="mod">
-          <ac:chgData name="Rasmus Thunberg" userId="af205901-3309-4d5c-9e14-c9ebbb4fdd00" providerId="ADAL" clId="{EC0F497D-4F42-4742-AD86-5855458E6A04}" dt="2023-10-03T09:29:07.948" v="409" actId="1076"/>
+          <ac:chgData name="Julian Soeltzer" userId="S::2677817@tcs.com::39542089-ba8e-403e-b2a2-6c80f71f2896" providerId="AD" clId="Web-{9CD95C4B-7DB1-4213-B09C-AB9A6D36F708}" dt="2023-10-04T13:23:26.833" v="8" actId="20577"/>
           <ac:spMkLst>
             <pc:docMk/>
-            <pc:sldMk cId="1813756110" sldId="257"/>
-            <ac:spMk id="12" creationId="{0064FD19-4BA5-5018-829D-9C6CA388109E}"/>
-          </ac:spMkLst>
-        </pc:spChg>
-        <pc:spChg chg="mod">
-          <ac:chgData name="Rasmus Thunberg" userId="af205901-3309-4d5c-9e14-c9ebbb4fdd00" providerId="ADAL" clId="{EC0F497D-4F42-4742-AD86-5855458E6A04}" dt="2023-10-03T09:29:29.672" v="411"/>
-          <ac:spMkLst>
-            <pc:docMk/>
-            <pc:sldMk cId="1813756110" sldId="257"/>
-            <ac:spMk id="17" creationId="{31623CCC-686B-1904-6B13-DDEA421612E7}"/>
-          </ac:spMkLst>
-        </pc:spChg>
-        <pc:spChg chg="mod">
-          <ac:chgData name="Rasmus Thunberg" userId="af205901-3309-4d5c-9e14-c9ebbb4fdd00" providerId="ADAL" clId="{EC0F497D-4F42-4742-AD86-5855458E6A04}" dt="2023-10-03T09:29:35.053" v="413"/>
-          <ac:spMkLst>
-            <pc:docMk/>
-            <pc:sldMk cId="1813756110" sldId="257"/>
-            <ac:spMk id="18" creationId="{7879456D-AB81-A833-178B-B9AB4C6DCC35}"/>
-          </ac:spMkLst>
-        </pc:spChg>
-        <pc:spChg chg="mod">
-          <ac:chgData name="Rasmus Thunberg" userId="af205901-3309-4d5c-9e14-c9ebbb4fdd00" providerId="ADAL" clId="{EC0F497D-4F42-4742-AD86-5855458E6A04}" dt="2023-10-03T09:32:31.853" v="477" actId="20577"/>
-          <ac:spMkLst>
-            <pc:docMk/>
-            <pc:sldMk cId="1813756110" sldId="257"/>
-            <ac:spMk id="19" creationId="{B7A1A7CF-DE15-625D-629F-040F51846305}"/>
-          </ac:spMkLst>
-        </pc:spChg>
-        <pc:spChg chg="mod">
-          <ac:chgData name="Rasmus Thunberg" userId="af205901-3309-4d5c-9e14-c9ebbb4fdd00" providerId="ADAL" clId="{EC0F497D-4F42-4742-AD86-5855458E6A04}" dt="2023-10-03T09:32:34.835" v="478" actId="20577"/>
-          <ac:spMkLst>
-            <pc:docMk/>
-            <pc:sldMk cId="1813756110" sldId="257"/>
-            <ac:spMk id="20" creationId="{809C2245-659B-ED24-E729-362132A9ADCC}"/>
-          </ac:spMkLst>
-        </pc:spChg>
-        <pc:spChg chg="mod">
-          <ac:chgData name="Rasmus Thunberg" userId="af205901-3309-4d5c-9e14-c9ebbb4fdd00" providerId="ADAL" clId="{EC0F497D-4F42-4742-AD86-5855458E6A04}" dt="2023-10-03T09:32:37.149" v="480" actId="20577"/>
-          <ac:spMkLst>
-            <pc:docMk/>
-            <pc:sldMk cId="1813756110" sldId="257"/>
-            <ac:spMk id="21" creationId="{5749F089-D1F1-2D1B-B890-ABB701F7879A}"/>
-          </ac:spMkLst>
-        </pc:spChg>
-        <pc:spChg chg="mod">
-          <ac:chgData name="Rasmus Thunberg" userId="af205901-3309-4d5c-9e14-c9ebbb4fdd00" providerId="ADAL" clId="{EC0F497D-4F42-4742-AD86-5855458E6A04}" dt="2023-10-03T09:26:13.016" v="363" actId="113"/>
-          <ac:spMkLst>
-            <pc:docMk/>
-            <pc:sldMk cId="1813756110" sldId="257"/>
-            <ac:spMk id="22" creationId="{3C0AAFF6-E5B6-FCF5-2746-613DB36B5743}"/>
-          </ac:spMkLst>
-        </pc:spChg>
-        <pc:spChg chg="mod">
-          <ac:chgData name="Rasmus Thunberg" userId="af205901-3309-4d5c-9e14-c9ebbb4fdd00" providerId="ADAL" clId="{EC0F497D-4F42-4742-AD86-5855458E6A04}" dt="2023-10-03T09:29:48.448" v="417" actId="20577"/>
-          <ac:spMkLst>
-            <pc:docMk/>
-            <pc:sldMk cId="1813756110" sldId="257"/>
-            <ac:spMk id="23" creationId="{5FB31F0A-A7FD-2E97-F95B-DF130557DEED}"/>
-          </ac:spMkLst>
-        </pc:spChg>
-        <pc:spChg chg="mod">
-          <ac:chgData name="Rasmus Thunberg" userId="af205901-3309-4d5c-9e14-c9ebbb4fdd00" providerId="ADAL" clId="{EC0F497D-4F42-4742-AD86-5855458E6A04}" dt="2023-10-03T09:18:51.668" v="223" actId="20577"/>
-          <ac:spMkLst>
-            <pc:docMk/>
-            <pc:sldMk cId="1813756110" sldId="257"/>
+            <pc:sldMk cId="2678938229" sldId="258"/>
             <ac:spMk id="28" creationId="{CD134E6C-9822-1EC1-15BF-8DCBC21212DB}"/>
           </ac:spMkLst>
         </pc:spChg>
+        <pc:picChg chg="add mod">
+          <ac:chgData name="Julian Soeltzer" userId="S::2677817@tcs.com::39542089-ba8e-403e-b2a2-6c80f71f2896" providerId="AD" clId="Web-{9CD95C4B-7DB1-4213-B09C-AB9A6D36F708}" dt="2023-10-04T13:23:30.927" v="9" actId="1076"/>
+          <ac:picMkLst>
+            <pc:docMk/>
+            <pc:sldMk cId="2678938229" sldId="258"/>
+            <ac:picMk id="6" creationId="{507A67E8-0854-3AB2-7D14-E5C7EAFDB726}"/>
+          </ac:picMkLst>
+        </pc:picChg>
       </pc:sldChg>
-      <pc:sldMasterChg chg="addSp mod">
-        <pc:chgData name="Rasmus Thunberg" userId="af205901-3309-4d5c-9e14-c9ebbb4fdd00" providerId="ADAL" clId="{EC0F497D-4F42-4742-AD86-5855458E6A04}" dt="2023-09-27T14:44:37.392" v="0" actId="33475"/>
-        <pc:sldMasterMkLst>
-          <pc:docMk/>
-          <pc:sldMasterMk cId="3854455681" sldId="2147483648"/>
-        </pc:sldMasterMkLst>
-        <pc:spChg chg="add">
-          <ac:chgData name="Rasmus Thunberg" userId="af205901-3309-4d5c-9e14-c9ebbb4fdd00" providerId="ADAL" clId="{EC0F497D-4F42-4742-AD86-5855458E6A04}" dt="2023-09-27T14:44:37.392" v="0" actId="33475"/>
-          <ac:spMkLst>
-            <pc:docMk/>
-            <pc:sldMasterMk cId="3854455681" sldId="2147483648"/>
-            <ac:spMk id="9" creationId="{C1CEB5C8-8A33-4866-7028-A35B86298FA6}"/>
-          </ac:spMkLst>
-        </pc:spChg>
-        <pc:spChg chg="add">
-          <ac:chgData name="Rasmus Thunberg" userId="af205901-3309-4d5c-9e14-c9ebbb4fdd00" providerId="ADAL" clId="{EC0F497D-4F42-4742-AD86-5855458E6A04}" dt="2023-09-27T14:44:37.392" v="0" actId="33475"/>
-          <ac:spMkLst>
-            <pc:docMk/>
-            <pc:sldMasterMk cId="3854455681" sldId="2147483648"/>
-            <ac:spMk id="10" creationId="{F670F0CF-A2B2-27AD-90E2-5F3C03DE8B31}"/>
-          </ac:spMkLst>
-        </pc:spChg>
-      </pc:sldMasterChg>
     </pc:docChg>
   </pc:docChgLst>
   <pc:docChgLst>
@@ -973,43 +695,321 @@
     </pc:docChg>
   </pc:docChgLst>
   <pc:docChgLst>
-    <pc:chgData name="Julian Soeltzer" userId="S::2677817@tcs.com::39542089-ba8e-403e-b2a2-6c80f71f2896" providerId="AD" clId="Web-{9CD95C4B-7DB1-4213-B09C-AB9A6D36F708}"/>
-    <pc:docChg chg="addSld modSld">
-      <pc:chgData name="Julian Soeltzer" userId="S::2677817@tcs.com::39542089-ba8e-403e-b2a2-6c80f71f2896" providerId="AD" clId="Web-{9CD95C4B-7DB1-4213-B09C-AB9A6D36F708}" dt="2023-10-04T13:27:46.438" v="56" actId="20577"/>
+    <pc:chgData name="Rasmus Thunberg" userId="af205901-3309-4d5c-9e14-c9ebbb4fdd00" providerId="ADAL" clId="{EC0F497D-4F42-4742-AD86-5855458E6A04}"/>
+    <pc:docChg chg="undo redo custSel mod addSld modSld modMainMaster">
+      <pc:chgData name="Rasmus Thunberg" userId="af205901-3309-4d5c-9e14-c9ebbb4fdd00" providerId="ADAL" clId="{EC0F497D-4F42-4742-AD86-5855458E6A04}" dt="2023-10-03T09:32:37.149" v="480" actId="20577"/>
       <pc:docMkLst>
         <pc:docMk/>
       </pc:docMkLst>
-      <pc:sldChg chg="addSp modSp add replId">
-        <pc:chgData name="Julian Soeltzer" userId="S::2677817@tcs.com::39542089-ba8e-403e-b2a2-6c80f71f2896" providerId="AD" clId="Web-{9CD95C4B-7DB1-4213-B09C-AB9A6D36F708}" dt="2023-10-04T13:27:46.438" v="56" actId="20577"/>
+      <pc:sldChg chg="addSp delSp modSp mod">
+        <pc:chgData name="Rasmus Thunberg" userId="af205901-3309-4d5c-9e14-c9ebbb4fdd00" providerId="ADAL" clId="{EC0F497D-4F42-4742-AD86-5855458E6A04}" dt="2023-10-03T07:07:49.721" v="204" actId="20577"/>
         <pc:sldMkLst>
           <pc:docMk/>
-          <pc:sldMk cId="2678938229" sldId="258"/>
+          <pc:sldMk cId="1182490399" sldId="256"/>
+        </pc:sldMkLst>
+        <pc:spChg chg="add mod">
+          <ac:chgData name="Rasmus Thunberg" userId="af205901-3309-4d5c-9e14-c9ebbb4fdd00" providerId="ADAL" clId="{EC0F497D-4F42-4742-AD86-5855458E6A04}" dt="2023-10-03T07:00:25.037" v="113" actId="14100"/>
+          <ac:spMkLst>
+            <pc:docMk/>
+            <pc:sldMk cId="1182490399" sldId="256"/>
+            <ac:spMk id="2" creationId="{9B542F04-3245-83B2-1CF1-EF062922034F}"/>
+          </ac:spMkLst>
+        </pc:spChg>
+        <pc:spChg chg="add del mod">
+          <ac:chgData name="Rasmus Thunberg" userId="af205901-3309-4d5c-9e14-c9ebbb4fdd00" providerId="ADAL" clId="{EC0F497D-4F42-4742-AD86-5855458E6A04}" dt="2023-10-03T07:00:49.868" v="120" actId="1076"/>
+          <ac:spMkLst>
+            <pc:docMk/>
+            <pc:sldMk cId="1182490399" sldId="256"/>
+            <ac:spMk id="3" creationId="{68188345-DAD2-0F54-EC92-CE1E36B55603}"/>
+          </ac:spMkLst>
+        </pc:spChg>
+        <pc:spChg chg="add mod">
+          <ac:chgData name="Rasmus Thunberg" userId="af205901-3309-4d5c-9e14-c9ebbb4fdd00" providerId="ADAL" clId="{EC0F497D-4F42-4742-AD86-5855458E6A04}" dt="2023-10-03T07:05:47.027" v="161" actId="20577"/>
+          <ac:spMkLst>
+            <pc:docMk/>
+            <pc:sldMk cId="1182490399" sldId="256"/>
+            <ac:spMk id="4" creationId="{DA3F3E79-8D77-FC87-A734-4E09595CB5DF}"/>
+          </ac:spMkLst>
+        </pc:spChg>
+        <pc:spChg chg="mod">
+          <ac:chgData name="Rasmus Thunberg" userId="af205901-3309-4d5c-9e14-c9ebbb4fdd00" providerId="ADAL" clId="{EC0F497D-4F42-4742-AD86-5855458E6A04}" dt="2023-10-03T06:45:13.963" v="8" actId="1076"/>
+          <ac:spMkLst>
+            <pc:docMk/>
+            <pc:sldMk cId="1182490399" sldId="256"/>
+            <ac:spMk id="10" creationId="{4E09E2CA-4D4F-0D16-CB68-E9BD517048D7}"/>
+          </ac:spMkLst>
+        </pc:spChg>
+        <pc:spChg chg="mod">
+          <ac:chgData name="Rasmus Thunberg" userId="af205901-3309-4d5c-9e14-c9ebbb4fdd00" providerId="ADAL" clId="{EC0F497D-4F42-4742-AD86-5855458E6A04}" dt="2023-10-03T06:45:18.833" v="9" actId="1076"/>
+          <ac:spMkLst>
+            <pc:docMk/>
+            <pc:sldMk cId="1182490399" sldId="256"/>
+            <ac:spMk id="12" creationId="{0064FD19-4BA5-5018-829D-9C6CA388109E}"/>
+          </ac:spMkLst>
+        </pc:spChg>
+        <pc:spChg chg="del">
+          <ac:chgData name="Rasmus Thunberg" userId="af205901-3309-4d5c-9e14-c9ebbb4fdd00" providerId="ADAL" clId="{EC0F497D-4F42-4742-AD86-5855458E6A04}" dt="2023-10-03T06:44:54.295" v="5" actId="478"/>
+          <ac:spMkLst>
+            <pc:docMk/>
+            <pc:sldMk cId="1182490399" sldId="256"/>
+            <ac:spMk id="13" creationId="{DDB44A97-DB00-159D-EF6E-37320E65CEE0}"/>
+          </ac:spMkLst>
+        </pc:spChg>
+        <pc:spChg chg="del">
+          <ac:chgData name="Rasmus Thunberg" userId="af205901-3309-4d5c-9e14-c9ebbb4fdd00" providerId="ADAL" clId="{EC0F497D-4F42-4742-AD86-5855458E6A04}" dt="2023-10-03T06:45:25.918" v="12" actId="478"/>
+          <ac:spMkLst>
+            <pc:docMk/>
+            <pc:sldMk cId="1182490399" sldId="256"/>
+            <ac:spMk id="15" creationId="{7936962E-73B7-A058-3F95-6F709C28C92E}"/>
+          </ac:spMkLst>
+        </pc:spChg>
+        <pc:spChg chg="del">
+          <ac:chgData name="Rasmus Thunberg" userId="af205901-3309-4d5c-9e14-c9ebbb4fdd00" providerId="ADAL" clId="{EC0F497D-4F42-4742-AD86-5855458E6A04}" dt="2023-10-03T06:45:24.073" v="11" actId="478"/>
+          <ac:spMkLst>
+            <pc:docMk/>
+            <pc:sldMk cId="1182490399" sldId="256"/>
+            <ac:spMk id="16" creationId="{A537BEAB-F929-8A29-12CA-395A0D9E816D}"/>
+          </ac:spMkLst>
+        </pc:spChg>
+        <pc:spChg chg="mod">
+          <ac:chgData name="Rasmus Thunberg" userId="af205901-3309-4d5c-9e14-c9ebbb4fdd00" providerId="ADAL" clId="{EC0F497D-4F42-4742-AD86-5855458E6A04}" dt="2023-10-03T06:46:59.042" v="49" actId="20577"/>
+          <ac:spMkLst>
+            <pc:docMk/>
+            <pc:sldMk cId="1182490399" sldId="256"/>
+            <ac:spMk id="17" creationId="{31623CCC-686B-1904-6B13-DDEA421612E7}"/>
+          </ac:spMkLst>
+        </pc:spChg>
+        <pc:spChg chg="mod">
+          <ac:chgData name="Rasmus Thunberg" userId="af205901-3309-4d5c-9e14-c9ebbb4fdd00" providerId="ADAL" clId="{EC0F497D-4F42-4742-AD86-5855458E6A04}" dt="2023-10-03T06:47:07.068" v="53" actId="5793"/>
+          <ac:spMkLst>
+            <pc:docMk/>
+            <pc:sldMk cId="1182490399" sldId="256"/>
+            <ac:spMk id="18" creationId="{7879456D-AB81-A833-178B-B9AB4C6DCC35}"/>
+          </ac:spMkLst>
+        </pc:spChg>
+        <pc:spChg chg="mod">
+          <ac:chgData name="Rasmus Thunberg" userId="af205901-3309-4d5c-9e14-c9ebbb4fdd00" providerId="ADAL" clId="{EC0F497D-4F42-4742-AD86-5855458E6A04}" dt="2023-10-03T07:07:36.150" v="202" actId="20577"/>
+          <ac:spMkLst>
+            <pc:docMk/>
+            <pc:sldMk cId="1182490399" sldId="256"/>
+            <ac:spMk id="19" creationId="{B7A1A7CF-DE15-625D-629F-040F51846305}"/>
+          </ac:spMkLst>
+        </pc:spChg>
+        <pc:spChg chg="add del mod">
+          <ac:chgData name="Rasmus Thunberg" userId="af205901-3309-4d5c-9e14-c9ebbb4fdd00" providerId="ADAL" clId="{EC0F497D-4F42-4742-AD86-5855458E6A04}" dt="2023-10-03T07:07:46.508" v="203" actId="20577"/>
+          <ac:spMkLst>
+            <pc:docMk/>
+            <pc:sldMk cId="1182490399" sldId="256"/>
+            <ac:spMk id="20" creationId="{809C2245-659B-ED24-E729-362132A9ADCC}"/>
+          </ac:spMkLst>
+        </pc:spChg>
+        <pc:spChg chg="mod">
+          <ac:chgData name="Rasmus Thunberg" userId="af205901-3309-4d5c-9e14-c9ebbb4fdd00" providerId="ADAL" clId="{EC0F497D-4F42-4742-AD86-5855458E6A04}" dt="2023-10-03T07:07:49.721" v="204" actId="20577"/>
+          <ac:spMkLst>
+            <pc:docMk/>
+            <pc:sldMk cId="1182490399" sldId="256"/>
+            <ac:spMk id="21" creationId="{5749F089-D1F1-2D1B-B890-ABB701F7879A}"/>
+          </ac:spMkLst>
+        </pc:spChg>
+        <pc:spChg chg="mod">
+          <ac:chgData name="Rasmus Thunberg" userId="af205901-3309-4d5c-9e14-c9ebbb4fdd00" providerId="ADAL" clId="{EC0F497D-4F42-4742-AD86-5855458E6A04}" dt="2023-10-03T07:00:29.734" v="114" actId="14100"/>
+          <ac:spMkLst>
+            <pc:docMk/>
+            <pc:sldMk cId="1182490399" sldId="256"/>
+            <ac:spMk id="23" creationId="{5FB31F0A-A7FD-2E97-F95B-DF130557DEED}"/>
+          </ac:spMkLst>
+        </pc:spChg>
+        <pc:spChg chg="del">
+          <ac:chgData name="Rasmus Thunberg" userId="af205901-3309-4d5c-9e14-c9ebbb4fdd00" providerId="ADAL" clId="{EC0F497D-4F42-4742-AD86-5855458E6A04}" dt="2023-10-03T07:02:53.742" v="121" actId="478"/>
+          <ac:spMkLst>
+            <pc:docMk/>
+            <pc:sldMk cId="1182490399" sldId="256"/>
+            <ac:spMk id="24" creationId="{79C05BEE-DBAB-2037-0E54-2102ABD3F219}"/>
+          </ac:spMkLst>
+        </pc:spChg>
+        <pc:spChg chg="del">
+          <ac:chgData name="Rasmus Thunberg" userId="af205901-3309-4d5c-9e14-c9ebbb4fdd00" providerId="ADAL" clId="{EC0F497D-4F42-4742-AD86-5855458E6A04}" dt="2023-10-03T07:02:57.827" v="124" actId="478"/>
+          <ac:spMkLst>
+            <pc:docMk/>
+            <pc:sldMk cId="1182490399" sldId="256"/>
+            <ac:spMk id="26" creationId="{7D6C9686-9837-B9D1-2DAE-011A02C9A498}"/>
+          </ac:spMkLst>
+        </pc:spChg>
+        <pc:spChg chg="del">
+          <ac:chgData name="Rasmus Thunberg" userId="af205901-3309-4d5c-9e14-c9ebbb4fdd00" providerId="ADAL" clId="{EC0F497D-4F42-4742-AD86-5855458E6A04}" dt="2023-10-03T07:02:59.696" v="125" actId="478"/>
+          <ac:spMkLst>
+            <pc:docMk/>
+            <pc:sldMk cId="1182490399" sldId="256"/>
+            <ac:spMk id="27" creationId="{0BA099BA-54CA-CFE8-D20B-57C4F5CF6014}"/>
+          </ac:spMkLst>
+        </pc:spChg>
+        <pc:grpChg chg="add mod">
+          <ac:chgData name="Rasmus Thunberg" userId="af205901-3309-4d5c-9e14-c9ebbb4fdd00" providerId="ADAL" clId="{EC0F497D-4F42-4742-AD86-5855458E6A04}" dt="2023-10-03T07:05:52.600" v="162" actId="14100"/>
+          <ac:grpSpMkLst>
+            <pc:docMk/>
+            <pc:sldMk cId="1182490399" sldId="256"/>
+            <ac:grpSpMk id="5" creationId="{C085AD75-9BB6-6DE2-78AD-DAD8A0E4AB77}"/>
+          </ac:grpSpMkLst>
+        </pc:grpChg>
+        <pc:picChg chg="del mod">
+          <ac:chgData name="Rasmus Thunberg" userId="af205901-3309-4d5c-9e14-c9ebbb4fdd00" providerId="ADAL" clId="{EC0F497D-4F42-4742-AD86-5855458E6A04}" dt="2023-10-03T06:44:51.007" v="4" actId="478"/>
+          <ac:picMkLst>
+            <pc:docMk/>
+            <pc:sldMk cId="1182490399" sldId="256"/>
+            <ac:picMk id="2050" creationId="{A19A6442-8A75-EBA6-6FE9-66FED6AB0D0F}"/>
+          </ac:picMkLst>
+        </pc:picChg>
+        <pc:cxnChg chg="mod">
+          <ac:chgData name="Rasmus Thunberg" userId="af205901-3309-4d5c-9e14-c9ebbb4fdd00" providerId="ADAL" clId="{EC0F497D-4F42-4742-AD86-5855458E6A04}" dt="2023-10-03T06:45:07.239" v="7" actId="1076"/>
+          <ac:cxnSpMkLst>
+            <pc:docMk/>
+            <pc:sldMk cId="1182490399" sldId="256"/>
+            <ac:cxnSpMk id="8" creationId="{226E5484-E12C-5EE5-8AC1-54ADF0803C9A}"/>
+          </ac:cxnSpMkLst>
+        </pc:cxnChg>
+      </pc:sldChg>
+      <pc:sldChg chg="modSp add mod">
+        <pc:chgData name="Rasmus Thunberg" userId="af205901-3309-4d5c-9e14-c9ebbb4fdd00" providerId="ADAL" clId="{EC0F497D-4F42-4742-AD86-5855458E6A04}" dt="2023-10-03T09:32:37.149" v="480" actId="20577"/>
+        <pc:sldMkLst>
+          <pc:docMk/>
+          <pc:sldMk cId="1813756110" sldId="257"/>
         </pc:sldMkLst>
         <pc:spChg chg="mod">
-          <ac:chgData name="Julian Soeltzer" userId="S::2677817@tcs.com::39542089-ba8e-403e-b2a2-6c80f71f2896" providerId="AD" clId="Web-{9CD95C4B-7DB1-4213-B09C-AB9A6D36F708}" dt="2023-10-04T13:27:46.438" v="56" actId="20577"/>
+          <ac:chgData name="Rasmus Thunberg" userId="af205901-3309-4d5c-9e14-c9ebbb4fdd00" providerId="ADAL" clId="{EC0F497D-4F42-4742-AD86-5855458E6A04}" dt="2023-10-03T09:30:03.437" v="424" actId="20577"/>
           <ac:spMkLst>
             <pc:docMk/>
-            <pc:sldMk cId="2678938229" sldId="258"/>
+            <pc:sldMk cId="1813756110" sldId="257"/>
+            <ac:spMk id="2" creationId="{9B542F04-3245-83B2-1CF1-EF062922034F}"/>
+          </ac:spMkLst>
+        </pc:spChg>
+        <pc:spChg chg="mod">
+          <ac:chgData name="Rasmus Thunberg" userId="af205901-3309-4d5c-9e14-c9ebbb4fdd00" providerId="ADAL" clId="{EC0F497D-4F42-4742-AD86-5855458E6A04}" dt="2023-10-03T09:30:53.898" v="438" actId="20577"/>
+          <ac:spMkLst>
+            <pc:docMk/>
+            <pc:sldMk cId="1813756110" sldId="257"/>
+            <ac:spMk id="3" creationId="{68188345-DAD2-0F54-EC92-CE1E36B55603}"/>
+          </ac:spMkLst>
+        </pc:spChg>
+        <pc:spChg chg="mod">
+          <ac:chgData name="Rasmus Thunberg" userId="af205901-3309-4d5c-9e14-c9ebbb4fdd00" providerId="ADAL" clId="{EC0F497D-4F42-4742-AD86-5855458E6A04}" dt="2023-10-03T09:32:23.345" v="476" actId="20577"/>
+          <ac:spMkLst>
+            <pc:docMk/>
+            <pc:sldMk cId="1813756110" sldId="257"/>
+            <ac:spMk id="4" creationId="{DA3F3E79-8D77-FC87-A734-4E09595CB5DF}"/>
+          </ac:spMkLst>
+        </pc:spChg>
+        <pc:spChg chg="mod">
+          <ac:chgData name="Rasmus Thunberg" userId="af205901-3309-4d5c-9e14-c9ebbb4fdd00" providerId="ADAL" clId="{EC0F497D-4F42-4742-AD86-5855458E6A04}" dt="2023-10-03T09:29:04.695" v="408" actId="1076"/>
+          <ac:spMkLst>
+            <pc:docMk/>
+            <pc:sldMk cId="1813756110" sldId="257"/>
+            <ac:spMk id="10" creationId="{4E09E2CA-4D4F-0D16-CB68-E9BD517048D7}"/>
+          </ac:spMkLst>
+        </pc:spChg>
+        <pc:spChg chg="mod">
+          <ac:chgData name="Rasmus Thunberg" userId="af205901-3309-4d5c-9e14-c9ebbb4fdd00" providerId="ADAL" clId="{EC0F497D-4F42-4742-AD86-5855458E6A04}" dt="2023-10-03T09:29:00.490" v="407" actId="1076"/>
+          <ac:spMkLst>
+            <pc:docMk/>
+            <pc:sldMk cId="1813756110" sldId="257"/>
             <ac:spMk id="11" creationId="{1BD89980-6D7F-C735-5105-AAB6DBBEFC76}"/>
           </ac:spMkLst>
         </pc:spChg>
         <pc:spChg chg="mod">
-          <ac:chgData name="Julian Soeltzer" userId="S::2677817@tcs.com::39542089-ba8e-403e-b2a2-6c80f71f2896" providerId="AD" clId="Web-{9CD95C4B-7DB1-4213-B09C-AB9A6D36F708}" dt="2023-10-04T13:23:26.833" v="8" actId="20577"/>
+          <ac:chgData name="Rasmus Thunberg" userId="af205901-3309-4d5c-9e14-c9ebbb4fdd00" providerId="ADAL" clId="{EC0F497D-4F42-4742-AD86-5855458E6A04}" dt="2023-10-03T09:29:07.948" v="409" actId="1076"/>
           <ac:spMkLst>
             <pc:docMk/>
-            <pc:sldMk cId="2678938229" sldId="258"/>
+            <pc:sldMk cId="1813756110" sldId="257"/>
+            <ac:spMk id="12" creationId="{0064FD19-4BA5-5018-829D-9C6CA388109E}"/>
+          </ac:spMkLst>
+        </pc:spChg>
+        <pc:spChg chg="mod">
+          <ac:chgData name="Rasmus Thunberg" userId="af205901-3309-4d5c-9e14-c9ebbb4fdd00" providerId="ADAL" clId="{EC0F497D-4F42-4742-AD86-5855458E6A04}" dt="2023-10-03T09:29:29.672" v="411"/>
+          <ac:spMkLst>
+            <pc:docMk/>
+            <pc:sldMk cId="1813756110" sldId="257"/>
+            <ac:spMk id="17" creationId="{31623CCC-686B-1904-6B13-DDEA421612E7}"/>
+          </ac:spMkLst>
+        </pc:spChg>
+        <pc:spChg chg="mod">
+          <ac:chgData name="Rasmus Thunberg" userId="af205901-3309-4d5c-9e14-c9ebbb4fdd00" providerId="ADAL" clId="{EC0F497D-4F42-4742-AD86-5855458E6A04}" dt="2023-10-03T09:29:35.053" v="413"/>
+          <ac:spMkLst>
+            <pc:docMk/>
+            <pc:sldMk cId="1813756110" sldId="257"/>
+            <ac:spMk id="18" creationId="{7879456D-AB81-A833-178B-B9AB4C6DCC35}"/>
+          </ac:spMkLst>
+        </pc:spChg>
+        <pc:spChg chg="mod">
+          <ac:chgData name="Rasmus Thunberg" userId="af205901-3309-4d5c-9e14-c9ebbb4fdd00" providerId="ADAL" clId="{EC0F497D-4F42-4742-AD86-5855458E6A04}" dt="2023-10-03T09:32:31.853" v="477" actId="20577"/>
+          <ac:spMkLst>
+            <pc:docMk/>
+            <pc:sldMk cId="1813756110" sldId="257"/>
+            <ac:spMk id="19" creationId="{B7A1A7CF-DE15-625D-629F-040F51846305}"/>
+          </ac:spMkLst>
+        </pc:spChg>
+        <pc:spChg chg="mod">
+          <ac:chgData name="Rasmus Thunberg" userId="af205901-3309-4d5c-9e14-c9ebbb4fdd00" providerId="ADAL" clId="{EC0F497D-4F42-4742-AD86-5855458E6A04}" dt="2023-10-03T09:32:34.835" v="478" actId="20577"/>
+          <ac:spMkLst>
+            <pc:docMk/>
+            <pc:sldMk cId="1813756110" sldId="257"/>
+            <ac:spMk id="20" creationId="{809C2245-659B-ED24-E729-362132A9ADCC}"/>
+          </ac:spMkLst>
+        </pc:spChg>
+        <pc:spChg chg="mod">
+          <ac:chgData name="Rasmus Thunberg" userId="af205901-3309-4d5c-9e14-c9ebbb4fdd00" providerId="ADAL" clId="{EC0F497D-4F42-4742-AD86-5855458E6A04}" dt="2023-10-03T09:32:37.149" v="480" actId="20577"/>
+          <ac:spMkLst>
+            <pc:docMk/>
+            <pc:sldMk cId="1813756110" sldId="257"/>
+            <ac:spMk id="21" creationId="{5749F089-D1F1-2D1B-B890-ABB701F7879A}"/>
+          </ac:spMkLst>
+        </pc:spChg>
+        <pc:spChg chg="mod">
+          <ac:chgData name="Rasmus Thunberg" userId="af205901-3309-4d5c-9e14-c9ebbb4fdd00" providerId="ADAL" clId="{EC0F497D-4F42-4742-AD86-5855458E6A04}" dt="2023-10-03T09:26:13.016" v="363" actId="113"/>
+          <ac:spMkLst>
+            <pc:docMk/>
+            <pc:sldMk cId="1813756110" sldId="257"/>
+            <ac:spMk id="22" creationId="{3C0AAFF6-E5B6-FCF5-2746-613DB36B5743}"/>
+          </ac:spMkLst>
+        </pc:spChg>
+        <pc:spChg chg="mod">
+          <ac:chgData name="Rasmus Thunberg" userId="af205901-3309-4d5c-9e14-c9ebbb4fdd00" providerId="ADAL" clId="{EC0F497D-4F42-4742-AD86-5855458E6A04}" dt="2023-10-03T09:29:48.448" v="417" actId="20577"/>
+          <ac:spMkLst>
+            <pc:docMk/>
+            <pc:sldMk cId="1813756110" sldId="257"/>
+            <ac:spMk id="23" creationId="{5FB31F0A-A7FD-2E97-F95B-DF130557DEED}"/>
+          </ac:spMkLst>
+        </pc:spChg>
+        <pc:spChg chg="mod">
+          <ac:chgData name="Rasmus Thunberg" userId="af205901-3309-4d5c-9e14-c9ebbb4fdd00" providerId="ADAL" clId="{EC0F497D-4F42-4742-AD86-5855458E6A04}" dt="2023-10-03T09:18:51.668" v="223" actId="20577"/>
+          <ac:spMkLst>
+            <pc:docMk/>
+            <pc:sldMk cId="1813756110" sldId="257"/>
             <ac:spMk id="28" creationId="{CD134E6C-9822-1EC1-15BF-8DCBC21212DB}"/>
           </ac:spMkLst>
         </pc:spChg>
-        <pc:picChg chg="add mod">
-          <ac:chgData name="Julian Soeltzer" userId="S::2677817@tcs.com::39542089-ba8e-403e-b2a2-6c80f71f2896" providerId="AD" clId="Web-{9CD95C4B-7DB1-4213-B09C-AB9A6D36F708}" dt="2023-10-04T13:23:30.927" v="9" actId="1076"/>
-          <ac:picMkLst>
-            <pc:docMk/>
-            <pc:sldMk cId="2678938229" sldId="258"/>
-            <ac:picMk id="6" creationId="{507A67E8-0854-3AB2-7D14-E5C7EAFDB726}"/>
-          </ac:picMkLst>
-        </pc:picChg>
       </pc:sldChg>
+      <pc:sldMasterChg chg="addSp mod">
+        <pc:chgData name="Rasmus Thunberg" userId="af205901-3309-4d5c-9e14-c9ebbb4fdd00" providerId="ADAL" clId="{EC0F497D-4F42-4742-AD86-5855458E6A04}" dt="2023-09-27T14:44:37.392" v="0" actId="33475"/>
+        <pc:sldMasterMkLst>
+          <pc:docMk/>
+          <pc:sldMasterMk cId="3854455681" sldId="2147483648"/>
+        </pc:sldMasterMkLst>
+        <pc:spChg chg="add">
+          <ac:chgData name="Rasmus Thunberg" userId="af205901-3309-4d5c-9e14-c9ebbb4fdd00" providerId="ADAL" clId="{EC0F497D-4F42-4742-AD86-5855458E6A04}" dt="2023-09-27T14:44:37.392" v="0" actId="33475"/>
+          <ac:spMkLst>
+            <pc:docMk/>
+            <pc:sldMasterMk cId="3854455681" sldId="2147483648"/>
+            <ac:spMk id="9" creationId="{C1CEB5C8-8A33-4866-7028-A35B86298FA6}"/>
+          </ac:spMkLst>
+        </pc:spChg>
+        <pc:spChg chg="add">
+          <ac:chgData name="Rasmus Thunberg" userId="af205901-3309-4d5c-9e14-c9ebbb4fdd00" providerId="ADAL" clId="{EC0F497D-4F42-4742-AD86-5855458E6A04}" dt="2023-09-27T14:44:37.392" v="0" actId="33475"/>
+          <ac:spMkLst>
+            <pc:docMk/>
+            <pc:sldMasterMk cId="3854455681" sldId="2147483648"/>
+            <ac:spMk id="10" creationId="{F670F0CF-A2B2-27AD-90E2-5F3C03DE8B31}"/>
+          </ac:spMkLst>
+        </pc:spChg>
+      </pc:sldMasterChg>
     </pc:docChg>
   </pc:docChgLst>
   <pc:docChgLst>
@@ -1448,7 +1448,7 @@
           <a:bodyPr/>
           <a:lstStyle/>
           <a:p>
-            <a:endParaRPr lang="en-US"/>
+            <a:endParaRPr lang="en-US" dirty="0"/>
           </a:p>
         </p:txBody>
       </p:sp>
@@ -5765,105 +5765,106 @@
           <a:lstStyle/>
           <a:p>
             <a:r>
-              <a:rPr lang="sv-SE" b="1"/>
+              <a:rPr lang="sv-SE" b="1" dirty="0" err="1"/>
               <a:t>Enviromental</a:t>
             </a:r>
-          </a:p>
-          <a:p>
-            <a:endParaRPr lang="sv-SE" b="1"/>
-          </a:p>
-          <a:p>
-            <a:endParaRPr lang="sv-SE" sz="1200"/>
-          </a:p>
-          <a:p>
-            <a:endParaRPr lang="sv-SE" sz="1200"/>
-          </a:p>
-          <a:p>
-            <a:endParaRPr lang="sv-SE" sz="1200"/>
-          </a:p>
-          <a:p>
-            <a:endParaRPr lang="sv-SE" sz="1200"/>
-          </a:p>
-          <a:p>
-            <a:endParaRPr lang="sv-SE" sz="1200"/>
-          </a:p>
-          <a:p>
-            <a:endParaRPr lang="sv-SE" sz="1200"/>
-          </a:p>
-          <a:p>
-            <a:endParaRPr lang="sv-SE" sz="1200"/>
-          </a:p>
-          <a:p>
-            <a:endParaRPr lang="sv-SE" sz="1200"/>
-          </a:p>
-          <a:p>
-            <a:endParaRPr lang="sv-SE" sz="1200"/>
-          </a:p>
-          <a:p>
-            <a:endParaRPr lang="sv-SE" sz="1200"/>
-          </a:p>
-          <a:p>
-            <a:endParaRPr lang="en-US" sz="1200"/>
-          </a:p>
-          <a:p>
-            <a:endParaRPr lang="en-US" sz="1200"/>
-          </a:p>
-          <a:p>
-            <a:endParaRPr lang="en-US" sz="1200"/>
-          </a:p>
-          <a:p>
-            <a:endParaRPr lang="en-US" sz="1200"/>
-          </a:p>
-          <a:p>
-            <a:endParaRPr lang="en-US" sz="1200"/>
-          </a:p>
-          <a:p>
-            <a:endParaRPr lang="en-US" sz="1200"/>
-          </a:p>
-          <a:p>
-            <a:endParaRPr lang="en-US" sz="1200"/>
-          </a:p>
-          <a:p>
-            <a:endParaRPr lang="en-US" sz="1200"/>
-          </a:p>
-          <a:p>
-            <a:endParaRPr lang="en-US" sz="1200"/>
-          </a:p>
-          <a:p>
-            <a:endParaRPr lang="en-US" sz="1200"/>
-          </a:p>
-          <a:p>
-            <a:endParaRPr lang="en-US" sz="1200"/>
-          </a:p>
-          <a:p>
-            <a:endParaRPr lang="en-US" sz="1200"/>
-          </a:p>
-          <a:p>
-            <a:endParaRPr lang="en-US" sz="1200"/>
-          </a:p>
-          <a:p>
-            <a:endParaRPr lang="en-US" sz="1200"/>
-          </a:p>
-          <a:p>
-            <a:endParaRPr lang="en-US" sz="1200"/>
-          </a:p>
-          <a:p>
-            <a:endParaRPr lang="en-US" sz="1200"/>
-          </a:p>
-          <a:p>
-            <a:endParaRPr lang="en-US" sz="1200"/>
-          </a:p>
-          <a:p>
-            <a:endParaRPr lang="en-US" sz="1200"/>
-          </a:p>
-          <a:p>
-            <a:endParaRPr lang="en-US" sz="1200"/>
-          </a:p>
-        </p:txBody>
-      </p:sp>
-      <p:sp>
-        <p:nvSpPr>
-          <p:cNvPr id="20" name="TextBox 19">
+            <a:endParaRPr lang="sv-SE" b="1" dirty="0"/>
+          </a:p>
+          <a:p>
+            <a:endParaRPr lang="sv-SE" b="1" dirty="0"/>
+          </a:p>
+          <a:p>
+            <a:endParaRPr lang="sv-SE" sz="1200" dirty="0"/>
+          </a:p>
+          <a:p>
+            <a:endParaRPr lang="sv-SE" sz="1200" dirty="0"/>
+          </a:p>
+          <a:p>
+            <a:endParaRPr lang="sv-SE" sz="1200" dirty="0"/>
+          </a:p>
+          <a:p>
+            <a:endParaRPr lang="sv-SE" sz="1200" dirty="0"/>
+          </a:p>
+          <a:p>
+            <a:endParaRPr lang="sv-SE" sz="1200" dirty="0"/>
+          </a:p>
+          <a:p>
+            <a:endParaRPr lang="sv-SE" sz="1200" dirty="0"/>
+          </a:p>
+          <a:p>
+            <a:endParaRPr lang="sv-SE" sz="1200" dirty="0"/>
+          </a:p>
+          <a:p>
+            <a:endParaRPr lang="sv-SE" sz="1200" dirty="0"/>
+          </a:p>
+          <a:p>
+            <a:endParaRPr lang="sv-SE" sz="1200" dirty="0"/>
+          </a:p>
+          <a:p>
+            <a:endParaRPr lang="sv-SE" sz="1200" dirty="0"/>
+          </a:p>
+          <a:p>
+            <a:endParaRPr lang="en-US" sz="1200" dirty="0"/>
+          </a:p>
+          <a:p>
+            <a:endParaRPr lang="en-US" sz="1200" dirty="0"/>
+          </a:p>
+          <a:p>
+            <a:endParaRPr lang="en-US" sz="1200" dirty="0"/>
+          </a:p>
+          <a:p>
+            <a:endParaRPr lang="en-US" sz="1200" dirty="0"/>
+          </a:p>
+          <a:p>
+            <a:endParaRPr lang="en-US" sz="1200" dirty="0"/>
+          </a:p>
+          <a:p>
+            <a:endParaRPr lang="en-US" sz="1200" dirty="0"/>
+          </a:p>
+          <a:p>
+            <a:endParaRPr lang="en-US" sz="1200" dirty="0"/>
+          </a:p>
+          <a:p>
+            <a:endParaRPr lang="en-US" sz="1200" dirty="0"/>
+          </a:p>
+          <a:p>
+            <a:endParaRPr lang="en-US" sz="1200" dirty="0"/>
+          </a:p>
+          <a:p>
+            <a:endParaRPr lang="en-US" sz="1200" dirty="0"/>
+          </a:p>
+          <a:p>
+            <a:endParaRPr lang="en-US" sz="1200" dirty="0"/>
+          </a:p>
+          <a:p>
+            <a:endParaRPr lang="en-US" sz="1200" dirty="0"/>
+          </a:p>
+          <a:p>
+            <a:endParaRPr lang="en-US" sz="1200" dirty="0"/>
+          </a:p>
+          <a:p>
+            <a:endParaRPr lang="en-US" sz="1200" dirty="0"/>
+          </a:p>
+          <a:p>
+            <a:endParaRPr lang="en-US" sz="1200" dirty="0"/>
+          </a:p>
+          <a:p>
+            <a:endParaRPr lang="en-US" sz="1200" dirty="0"/>
+          </a:p>
+          <a:p>
+            <a:endParaRPr lang="en-US" sz="1200" dirty="0"/>
+          </a:p>
+          <a:p>
+            <a:endParaRPr lang="en-US" sz="1200" dirty="0"/>
+          </a:p>
+          <a:p>
+            <a:endParaRPr lang="en-US" sz="1200" dirty="0"/>
+          </a:p>
+        </p:txBody>
+      </p:sp>
+      <p:sp>
+        <p:nvSpPr>
+          <p:cNvPr id="20" name="Social">
             <a:extLst>
               <a:ext uri="{FF2B5EF4-FFF2-40B4-BE49-F238E27FC236}">
                 <a16:creationId xmlns:a16="http://schemas.microsoft.com/office/drawing/2014/main" id="{809C2245-659B-ED24-E729-362132A9ADCC}"/>
@@ -5875,8 +5876,8 @@
         </p:nvSpPr>
         <p:spPr>
           <a:xfrm>
-            <a:off x="7962928" y="625892"/>
-            <a:ext cx="2201132" cy="6063198"/>
+            <a:off x="7962928" y="636909"/>
+            <a:ext cx="2201132" cy="5909310"/>
           </a:xfrm>
           <a:prstGeom prst="rect">
             <a:avLst/>
@@ -5902,1060 +5903,299 @@
             </a:r>
           </a:p>
           <a:p>
+            <a:r>
+              <a:rPr lang="sv-SE" sz="1000" i="1" dirty="0">
+                <a:ea typeface="+mn-lt"/>
+                <a:cs typeface="+mn-lt"/>
+              </a:rPr>
+              <a:t>[[social]]</a:t>
+            </a:r>
+          </a:p>
+          <a:p>
             <a:pPr marL="285750" indent="-285750">
               <a:buFont typeface="Arial"/>
               <a:buChar char="•"/>
             </a:pPr>
-            <a:r>
-              <a:rPr lang="sv-SE" sz="1000" i="1" dirty="0" err="1">
-                <a:ea typeface="+mn-lt"/>
-                <a:cs typeface="+mn-lt"/>
-              </a:rPr>
-              <a:t>They</a:t>
-            </a:r>
-            <a:r>
-              <a:rPr lang="sv-SE" sz="1000" i="1" dirty="0">
-                <a:ea typeface="+mn-lt"/>
-                <a:cs typeface="+mn-lt"/>
-              </a:rPr>
-              <a:t> </a:t>
-            </a:r>
-            <a:r>
-              <a:rPr lang="sv-SE" sz="1000" i="1" dirty="0" err="1">
-                <a:ea typeface="+mn-lt"/>
-                <a:cs typeface="+mn-lt"/>
-              </a:rPr>
-              <a:t>launched</a:t>
-            </a:r>
-            <a:r>
-              <a:rPr lang="sv-SE" sz="1000" i="1" dirty="0">
-                <a:ea typeface="+mn-lt"/>
-                <a:cs typeface="+mn-lt"/>
-              </a:rPr>
-              <a:t> </a:t>
-            </a:r>
-            <a:r>
-              <a:rPr lang="sv-SE" sz="1000" i="1" dirty="0" err="1">
-                <a:ea typeface="+mn-lt"/>
-                <a:cs typeface="+mn-lt"/>
-              </a:rPr>
-              <a:t>sustainability</a:t>
-            </a:r>
-            <a:r>
-              <a:rPr lang="sv-SE" sz="1000" i="1" dirty="0">
-                <a:ea typeface="+mn-lt"/>
-                <a:cs typeface="+mn-lt"/>
-              </a:rPr>
-              <a:t> at </a:t>
-            </a:r>
-            <a:r>
-              <a:rPr lang="sv-SE" sz="1000" i="1" dirty="0" err="1">
-                <a:ea typeface="+mn-lt"/>
-                <a:cs typeface="+mn-lt"/>
-              </a:rPr>
-              <a:t>heart</a:t>
-            </a:r>
-            <a:r>
-              <a:rPr lang="sv-SE" sz="1000" i="1" dirty="0">
-                <a:ea typeface="+mn-lt"/>
-                <a:cs typeface="+mn-lt"/>
-              </a:rPr>
-              <a:t> program to </a:t>
-            </a:r>
-            <a:r>
-              <a:rPr lang="sv-SE" sz="1000" i="1" dirty="0" err="1">
-                <a:ea typeface="+mn-lt"/>
-                <a:cs typeface="+mn-lt"/>
-              </a:rPr>
-              <a:t>inform</a:t>
-            </a:r>
-            <a:r>
-              <a:rPr lang="sv-SE" sz="1000" i="1" dirty="0">
-                <a:ea typeface="+mn-lt"/>
-                <a:cs typeface="+mn-lt"/>
-              </a:rPr>
-              <a:t> and </a:t>
-            </a:r>
-            <a:r>
-              <a:rPr lang="sv-SE" sz="1000" i="1" dirty="0" err="1">
-                <a:ea typeface="+mn-lt"/>
-                <a:cs typeface="+mn-lt"/>
-              </a:rPr>
-              <a:t>empower</a:t>
-            </a:r>
-            <a:r>
-              <a:rPr lang="sv-SE" sz="1000" i="1" dirty="0">
-                <a:ea typeface="+mn-lt"/>
-                <a:cs typeface="+mn-lt"/>
-              </a:rPr>
-              <a:t> </a:t>
-            </a:r>
-            <a:r>
-              <a:rPr lang="sv-SE" sz="1000" i="1" dirty="0" err="1">
-                <a:ea typeface="+mn-lt"/>
-                <a:cs typeface="+mn-lt"/>
-              </a:rPr>
-              <a:t>employees</a:t>
-            </a:r>
-            <a:r>
-              <a:rPr lang="sv-SE" sz="1000" i="1" dirty="0">
-                <a:ea typeface="+mn-lt"/>
-                <a:cs typeface="+mn-lt"/>
-              </a:rPr>
-              <a:t> to support </a:t>
-            </a:r>
-            <a:r>
-              <a:rPr lang="sv-SE" sz="1000" i="1" dirty="0" err="1">
-                <a:ea typeface="+mn-lt"/>
-                <a:cs typeface="+mn-lt"/>
-              </a:rPr>
-              <a:t>their</a:t>
-            </a:r>
-            <a:r>
-              <a:rPr lang="sv-SE" sz="1000" i="1" dirty="0">
-                <a:ea typeface="+mn-lt"/>
-                <a:cs typeface="+mn-lt"/>
-              </a:rPr>
-              <a:t> joint </a:t>
-            </a:r>
-            <a:r>
-              <a:rPr lang="sv-SE" sz="1000" i="1" dirty="0" err="1">
-                <a:ea typeface="+mn-lt"/>
-                <a:cs typeface="+mn-lt"/>
-              </a:rPr>
-              <a:t>engagement</a:t>
-            </a:r>
-            <a:r>
-              <a:rPr lang="sv-SE" sz="1000" i="1" dirty="0">
-                <a:ea typeface="+mn-lt"/>
-                <a:cs typeface="+mn-lt"/>
-              </a:rPr>
-              <a:t> </a:t>
-            </a:r>
-            <a:r>
-              <a:rPr lang="sv-SE" sz="1000" i="1" dirty="0" err="1">
-                <a:ea typeface="+mn-lt"/>
-                <a:cs typeface="+mn-lt"/>
-              </a:rPr>
-              <a:t>concerning</a:t>
-            </a:r>
-            <a:r>
-              <a:rPr lang="sv-SE" sz="1000" i="1" dirty="0">
-                <a:ea typeface="+mn-lt"/>
-                <a:cs typeface="+mn-lt"/>
-              </a:rPr>
-              <a:t> </a:t>
-            </a:r>
-            <a:r>
-              <a:rPr lang="sv-SE" sz="1000" i="1" dirty="0" err="1">
-                <a:ea typeface="+mn-lt"/>
-                <a:cs typeface="+mn-lt"/>
-              </a:rPr>
-              <a:t>sustainability</a:t>
-            </a:r>
-            <a:r>
-              <a:rPr lang="sv-SE" sz="1000" i="1" dirty="0">
-                <a:ea typeface="+mn-lt"/>
-                <a:cs typeface="+mn-lt"/>
-              </a:rPr>
-              <a:t>  </a:t>
-            </a:r>
-            <a:r>
-              <a:rPr lang="sv-SE" sz="1000" dirty="0">
-                <a:ea typeface="+mn-lt"/>
-                <a:cs typeface="+mn-lt"/>
-              </a:rPr>
-              <a:t> </a:t>
-            </a:r>
+            <a:endParaRPr lang="sv-SE" sz="1000" i="1" dirty="0">
+              <a:ea typeface="+mn-lt"/>
+              <a:cs typeface="+mn-lt"/>
+            </a:endParaRPr>
           </a:p>
           <a:p>
             <a:pPr marL="285750" indent="-285750">
               <a:buFont typeface="Arial"/>
               <a:buChar char="•"/>
             </a:pPr>
-            <a:r>
-              <a:rPr lang="sv-SE" sz="1000" i="1" dirty="0" err="1">
-                <a:ea typeface="+mn-lt"/>
-                <a:cs typeface="+mn-lt"/>
-              </a:rPr>
-              <a:t>Improve</a:t>
-            </a:r>
-            <a:r>
-              <a:rPr lang="sv-SE" sz="1000" i="1" dirty="0">
-                <a:ea typeface="+mn-lt"/>
-                <a:cs typeface="+mn-lt"/>
-              </a:rPr>
-              <a:t> </a:t>
-            </a:r>
-            <a:r>
-              <a:rPr lang="sv-SE" sz="1000" i="1" dirty="0" err="1">
-                <a:ea typeface="+mn-lt"/>
-                <a:cs typeface="+mn-lt"/>
-              </a:rPr>
-              <a:t>livelihood</a:t>
-            </a:r>
-            <a:r>
-              <a:rPr lang="sv-SE" sz="1000" i="1" dirty="0">
-                <a:ea typeface="+mn-lt"/>
-                <a:cs typeface="+mn-lt"/>
-              </a:rPr>
-              <a:t> of small farmers and </a:t>
-            </a:r>
-            <a:r>
-              <a:rPr lang="sv-SE" sz="1000" i="1" dirty="0" err="1">
-                <a:ea typeface="+mn-lt"/>
-                <a:cs typeface="+mn-lt"/>
-              </a:rPr>
-              <a:t>protection</a:t>
-            </a:r>
-            <a:r>
-              <a:rPr lang="sv-SE" sz="1000" i="1" dirty="0">
-                <a:ea typeface="+mn-lt"/>
-                <a:cs typeface="+mn-lt"/>
-              </a:rPr>
-              <a:t> of </a:t>
-            </a:r>
-            <a:r>
-              <a:rPr lang="sv-SE" sz="1000" i="1" dirty="0" err="1">
-                <a:ea typeface="+mn-lt"/>
-                <a:cs typeface="+mn-lt"/>
-              </a:rPr>
-              <a:t>nature</a:t>
-            </a:r>
-            <a:r>
-              <a:rPr lang="sv-SE" sz="1000" dirty="0">
-                <a:ea typeface="+mn-lt"/>
-                <a:cs typeface="+mn-lt"/>
-              </a:rPr>
-              <a:t> </a:t>
-            </a:r>
+            <a:endParaRPr lang="sv-SE" sz="1000" i="1" dirty="0">
+              <a:ea typeface="+mn-lt"/>
+              <a:cs typeface="+mn-lt"/>
+            </a:endParaRPr>
           </a:p>
           <a:p>
             <a:pPr marL="285750" indent="-285750">
               <a:buFont typeface="Arial"/>
               <a:buChar char="•"/>
             </a:pPr>
-            <a:r>
-              <a:rPr lang="sv-SE" sz="1000" i="1" dirty="0" err="1">
-                <a:ea typeface="+mn-lt"/>
-                <a:cs typeface="+mn-lt"/>
-              </a:rPr>
-              <a:t>Continuously</a:t>
-            </a:r>
-            <a:r>
-              <a:rPr lang="sv-SE" sz="1000" i="1" dirty="0">
-                <a:ea typeface="+mn-lt"/>
-                <a:cs typeface="+mn-lt"/>
-              </a:rPr>
-              <a:t> </a:t>
-            </a:r>
-            <a:r>
-              <a:rPr lang="sv-SE" sz="1000" i="1" dirty="0" err="1">
-                <a:ea typeface="+mn-lt"/>
-                <a:cs typeface="+mn-lt"/>
-              </a:rPr>
-              <a:t>collaborate</a:t>
-            </a:r>
-            <a:r>
-              <a:rPr lang="sv-SE" sz="1000" i="1" dirty="0">
-                <a:ea typeface="+mn-lt"/>
-                <a:cs typeface="+mn-lt"/>
-              </a:rPr>
-              <a:t> </a:t>
-            </a:r>
-            <a:r>
-              <a:rPr lang="sv-SE" sz="1000" i="1" dirty="0" err="1">
-                <a:ea typeface="+mn-lt"/>
-                <a:cs typeface="+mn-lt"/>
-              </a:rPr>
-              <a:t>with</a:t>
-            </a:r>
-            <a:r>
-              <a:rPr lang="sv-SE" sz="1000" i="1" dirty="0">
-                <a:ea typeface="+mn-lt"/>
-                <a:cs typeface="+mn-lt"/>
-              </a:rPr>
-              <a:t> OECD </a:t>
-            </a:r>
-            <a:r>
-              <a:rPr lang="sv-SE" sz="1000" i="1" dirty="0" err="1">
-                <a:ea typeface="+mn-lt"/>
-                <a:cs typeface="+mn-lt"/>
-              </a:rPr>
-              <a:t>supported</a:t>
-            </a:r>
-            <a:r>
-              <a:rPr lang="sv-SE" sz="1000" i="1" dirty="0">
-                <a:ea typeface="+mn-lt"/>
-                <a:cs typeface="+mn-lt"/>
-              </a:rPr>
-              <a:t> global business </a:t>
-            </a:r>
-            <a:r>
-              <a:rPr lang="sv-SE" sz="1000" i="1" dirty="0" err="1">
-                <a:ea typeface="+mn-lt"/>
-                <a:cs typeface="+mn-lt"/>
-              </a:rPr>
-              <a:t>coalition</a:t>
-            </a:r>
-            <a:r>
-              <a:rPr lang="sv-SE" sz="1000" i="1" dirty="0">
-                <a:ea typeface="+mn-lt"/>
-                <a:cs typeface="+mn-lt"/>
-              </a:rPr>
-              <a:t> Business for </a:t>
-            </a:r>
-            <a:r>
-              <a:rPr lang="sv-SE" sz="1000" i="1" dirty="0" err="1">
-                <a:ea typeface="+mn-lt"/>
-                <a:cs typeface="+mn-lt"/>
-              </a:rPr>
-              <a:t>Inclusive</a:t>
-            </a:r>
-            <a:r>
-              <a:rPr lang="sv-SE" sz="1000" i="1" dirty="0">
-                <a:ea typeface="+mn-lt"/>
-                <a:cs typeface="+mn-lt"/>
-              </a:rPr>
-              <a:t> </a:t>
-            </a:r>
-            <a:r>
-              <a:rPr lang="sv-SE" sz="1000" i="1" dirty="0" err="1">
-                <a:ea typeface="+mn-lt"/>
-                <a:cs typeface="+mn-lt"/>
-              </a:rPr>
-              <a:t>Growth</a:t>
-            </a:r>
-            <a:r>
-              <a:rPr lang="sv-SE" sz="1000" i="1" dirty="0">
-                <a:ea typeface="+mn-lt"/>
-                <a:cs typeface="+mn-lt"/>
-              </a:rPr>
-              <a:t> (B4IG)</a:t>
-            </a:r>
-            <a:r>
-              <a:rPr lang="sv-SE" sz="1000" dirty="0">
-                <a:ea typeface="+mn-lt"/>
-                <a:cs typeface="+mn-lt"/>
-              </a:rPr>
-              <a:t> </a:t>
-            </a:r>
+            <a:endParaRPr lang="sv-SE" sz="1000" i="1" dirty="0">
+              <a:ea typeface="+mn-lt"/>
+              <a:cs typeface="+mn-lt"/>
+            </a:endParaRPr>
           </a:p>
           <a:p>
             <a:pPr marL="285750" indent="-285750">
               <a:buFont typeface="Arial"/>
               <a:buChar char="•"/>
             </a:pPr>
-            <a:r>
-              <a:rPr lang="sv-SE" sz="1000" i="1" dirty="0">
-                <a:ea typeface="+mn-lt"/>
-                <a:cs typeface="+mn-lt"/>
-              </a:rPr>
-              <a:t>Has </a:t>
-            </a:r>
-            <a:r>
-              <a:rPr lang="sv-SE" sz="1000" i="1" dirty="0" err="1">
-                <a:ea typeface="+mn-lt"/>
-                <a:cs typeface="+mn-lt"/>
-              </a:rPr>
-              <a:t>launched</a:t>
-            </a:r>
-            <a:r>
-              <a:rPr lang="sv-SE" sz="1000" i="1" dirty="0">
-                <a:ea typeface="+mn-lt"/>
-                <a:cs typeface="+mn-lt"/>
-              </a:rPr>
-              <a:t> the DE&amp;I </a:t>
-            </a:r>
-            <a:r>
-              <a:rPr lang="sv-SE" sz="1000" i="1" dirty="0" err="1">
-                <a:ea typeface="+mn-lt"/>
-                <a:cs typeface="+mn-lt"/>
-              </a:rPr>
-              <a:t>campaign</a:t>
-            </a:r>
-            <a:r>
-              <a:rPr lang="sv-SE" sz="1000" i="1" dirty="0">
-                <a:ea typeface="+mn-lt"/>
-                <a:cs typeface="+mn-lt"/>
-              </a:rPr>
-              <a:t> “I </a:t>
-            </a:r>
-            <a:r>
-              <a:rPr lang="sv-SE" sz="1000" i="1" dirty="0" err="1">
-                <a:ea typeface="+mn-lt"/>
-                <a:cs typeface="+mn-lt"/>
-              </a:rPr>
-              <a:t>am</a:t>
-            </a:r>
-            <a:r>
-              <a:rPr lang="sv-SE" sz="1000" i="1" dirty="0">
-                <a:ea typeface="+mn-lt"/>
-                <a:cs typeface="+mn-lt"/>
-              </a:rPr>
-              <a:t> </a:t>
-            </a:r>
-            <a:r>
-              <a:rPr lang="sv-SE" sz="1000" i="1" dirty="0" err="1">
-                <a:ea typeface="+mn-lt"/>
-                <a:cs typeface="+mn-lt"/>
-              </a:rPr>
-              <a:t>unique</a:t>
-            </a:r>
-            <a:r>
-              <a:rPr lang="sv-SE" sz="1000" i="1" dirty="0">
-                <a:ea typeface="+mn-lt"/>
-                <a:cs typeface="+mn-lt"/>
-              </a:rPr>
-              <a:t>. </a:t>
-            </a:r>
-            <a:r>
-              <a:rPr lang="sv-SE" sz="1000" i="1" dirty="0" err="1">
-                <a:ea typeface="+mn-lt"/>
-                <a:cs typeface="+mn-lt"/>
-              </a:rPr>
-              <a:t>We</a:t>
-            </a:r>
-            <a:r>
-              <a:rPr lang="sv-SE" sz="1000" i="1" dirty="0">
-                <a:ea typeface="+mn-lt"/>
-                <a:cs typeface="+mn-lt"/>
-              </a:rPr>
-              <a:t> </a:t>
-            </a:r>
-            <a:r>
-              <a:rPr lang="sv-SE" sz="1000" i="1" dirty="0" err="1">
-                <a:ea typeface="+mn-lt"/>
-                <a:cs typeface="+mn-lt"/>
-              </a:rPr>
-              <a:t>are</a:t>
-            </a:r>
-            <a:r>
-              <a:rPr lang="sv-SE" sz="1000" i="1" dirty="0">
-                <a:ea typeface="+mn-lt"/>
-                <a:cs typeface="+mn-lt"/>
-              </a:rPr>
-              <a:t> Henkel” and an </a:t>
-            </a:r>
-            <a:r>
-              <a:rPr lang="sv-SE" sz="1000" i="1" dirty="0" err="1">
-                <a:ea typeface="+mn-lt"/>
-                <a:cs typeface="+mn-lt"/>
-              </a:rPr>
-              <a:t>diversity</a:t>
-            </a:r>
-            <a:r>
-              <a:rPr lang="sv-SE" sz="1000" i="1" dirty="0">
-                <a:ea typeface="+mn-lt"/>
-                <a:cs typeface="+mn-lt"/>
-              </a:rPr>
-              <a:t> </a:t>
-            </a:r>
-            <a:r>
-              <a:rPr lang="sv-SE" sz="1000" i="1" dirty="0" err="1">
-                <a:ea typeface="+mn-lt"/>
-                <a:cs typeface="+mn-lt"/>
-              </a:rPr>
-              <a:t>week</a:t>
-            </a:r>
-            <a:r>
-              <a:rPr lang="sv-SE" sz="1000" i="1" dirty="0">
-                <a:ea typeface="+mn-lt"/>
-                <a:cs typeface="+mn-lt"/>
-              </a:rPr>
-              <a:t> </a:t>
-            </a:r>
-            <a:r>
-              <a:rPr lang="sv-SE" sz="1000" i="1" dirty="0" err="1">
-                <a:ea typeface="+mn-lt"/>
-                <a:cs typeface="+mn-lt"/>
-              </a:rPr>
-              <a:t>that</a:t>
-            </a:r>
-            <a:r>
-              <a:rPr lang="sv-SE" sz="1000" i="1" dirty="0">
-                <a:ea typeface="+mn-lt"/>
-                <a:cs typeface="+mn-lt"/>
-              </a:rPr>
-              <a:t> </a:t>
-            </a:r>
-            <a:r>
-              <a:rPr lang="sv-SE" sz="1000" i="1" dirty="0" err="1">
-                <a:ea typeface="+mn-lt"/>
-                <a:cs typeface="+mn-lt"/>
-              </a:rPr>
-              <a:t>aims</a:t>
-            </a:r>
-            <a:r>
-              <a:rPr lang="sv-SE" sz="1000" i="1" dirty="0">
-                <a:ea typeface="+mn-lt"/>
-                <a:cs typeface="+mn-lt"/>
-              </a:rPr>
-              <a:t> to </a:t>
-            </a:r>
-            <a:r>
-              <a:rPr lang="sv-SE" sz="1000" i="1" dirty="0" err="1">
-                <a:ea typeface="+mn-lt"/>
-                <a:cs typeface="+mn-lt"/>
-              </a:rPr>
-              <a:t>expand</a:t>
-            </a:r>
-            <a:r>
-              <a:rPr lang="sv-SE" sz="1000" i="1" dirty="0">
-                <a:ea typeface="+mn-lt"/>
-                <a:cs typeface="+mn-lt"/>
-              </a:rPr>
-              <a:t> the </a:t>
-            </a:r>
-            <a:r>
-              <a:rPr lang="sv-SE" sz="1000" i="1" dirty="0" err="1">
-                <a:ea typeface="+mn-lt"/>
-                <a:cs typeface="+mn-lt"/>
-              </a:rPr>
-              <a:t>knowledge</a:t>
-            </a:r>
-            <a:r>
-              <a:rPr lang="sv-SE" sz="1000" i="1" dirty="0">
-                <a:ea typeface="+mn-lt"/>
-                <a:cs typeface="+mn-lt"/>
-              </a:rPr>
-              <a:t> </a:t>
-            </a:r>
-            <a:r>
-              <a:rPr lang="sv-SE" sz="1000" i="1" dirty="0" err="1">
-                <a:ea typeface="+mn-lt"/>
-                <a:cs typeface="+mn-lt"/>
-              </a:rPr>
-              <a:t>among</a:t>
-            </a:r>
-            <a:r>
-              <a:rPr lang="sv-SE" sz="1000" i="1" dirty="0">
-                <a:ea typeface="+mn-lt"/>
-                <a:cs typeface="+mn-lt"/>
-              </a:rPr>
-              <a:t> </a:t>
-            </a:r>
-            <a:r>
-              <a:rPr lang="sv-SE" sz="1000" i="1" dirty="0" err="1">
-                <a:ea typeface="+mn-lt"/>
-                <a:cs typeface="+mn-lt"/>
-              </a:rPr>
-              <a:t>workers</a:t>
-            </a:r>
-            <a:r>
-              <a:rPr lang="sv-SE" sz="1000" i="1" dirty="0">
-                <a:ea typeface="+mn-lt"/>
-                <a:cs typeface="+mn-lt"/>
-              </a:rPr>
-              <a:t> </a:t>
-            </a:r>
-            <a:r>
-              <a:rPr lang="sv-SE" sz="1000" i="1" dirty="0" err="1">
-                <a:ea typeface="+mn-lt"/>
-                <a:cs typeface="+mn-lt"/>
-              </a:rPr>
-              <a:t>about</a:t>
-            </a:r>
-            <a:r>
-              <a:rPr lang="sv-SE" sz="1000" i="1" dirty="0">
-                <a:ea typeface="+mn-lt"/>
-                <a:cs typeface="+mn-lt"/>
-              </a:rPr>
-              <a:t> </a:t>
-            </a:r>
-            <a:r>
-              <a:rPr lang="sv-SE" sz="1000" i="1" dirty="0" err="1">
-                <a:ea typeface="+mn-lt"/>
-                <a:cs typeface="+mn-lt"/>
-              </a:rPr>
-              <a:t>diversity</a:t>
-            </a:r>
-            <a:r>
-              <a:rPr lang="sv-SE" sz="1000" i="1" dirty="0">
-                <a:ea typeface="+mn-lt"/>
-                <a:cs typeface="+mn-lt"/>
-              </a:rPr>
-              <a:t>, </a:t>
-            </a:r>
-            <a:r>
-              <a:rPr lang="sv-SE" sz="1000" i="1" dirty="0" err="1">
-                <a:ea typeface="+mn-lt"/>
-                <a:cs typeface="+mn-lt"/>
-              </a:rPr>
-              <a:t>equity</a:t>
-            </a:r>
-            <a:r>
-              <a:rPr lang="sv-SE" sz="1000" i="1" dirty="0">
-                <a:ea typeface="+mn-lt"/>
-                <a:cs typeface="+mn-lt"/>
-              </a:rPr>
-              <a:t> and </a:t>
-            </a:r>
-            <a:r>
-              <a:rPr lang="sv-SE" sz="1000" i="1" dirty="0" err="1">
-                <a:ea typeface="+mn-lt"/>
-                <a:cs typeface="+mn-lt"/>
-              </a:rPr>
-              <a:t>inclusion</a:t>
-            </a:r>
-            <a:r>
-              <a:rPr lang="sv-SE" sz="1000" dirty="0">
-                <a:ea typeface="+mn-lt"/>
-                <a:cs typeface="+mn-lt"/>
-              </a:rPr>
-              <a:t> </a:t>
-            </a:r>
+            <a:endParaRPr lang="sv-SE" sz="1000" i="1" dirty="0">
+              <a:ea typeface="+mn-lt"/>
+              <a:cs typeface="+mn-lt"/>
+            </a:endParaRPr>
           </a:p>
           <a:p>
             <a:pPr marL="285750" indent="-285750">
               <a:buFont typeface="Arial"/>
               <a:buChar char="•"/>
             </a:pPr>
-            <a:r>
-              <a:rPr lang="sv-SE" sz="1000" i="1" dirty="0" err="1">
-                <a:ea typeface="+mn-lt"/>
-                <a:cs typeface="+mn-lt"/>
-              </a:rPr>
-              <a:t>Have</a:t>
-            </a:r>
-            <a:r>
-              <a:rPr lang="sv-SE" sz="1000" i="1" dirty="0">
-                <a:ea typeface="+mn-lt"/>
-                <a:cs typeface="+mn-lt"/>
-              </a:rPr>
-              <a:t> a LGBTQ+ </a:t>
-            </a:r>
-            <a:r>
-              <a:rPr lang="sv-SE" sz="1000" i="1" dirty="0" err="1">
-                <a:ea typeface="+mn-lt"/>
-                <a:cs typeface="+mn-lt"/>
-              </a:rPr>
-              <a:t>Network</a:t>
-            </a:r>
-            <a:r>
-              <a:rPr lang="sv-SE" sz="1000" i="1" dirty="0">
-                <a:ea typeface="+mn-lt"/>
-                <a:cs typeface="+mn-lt"/>
-              </a:rPr>
-              <a:t> </a:t>
-            </a:r>
-            <a:r>
-              <a:rPr lang="sv-SE" sz="1000" i="1" dirty="0" err="1">
-                <a:ea typeface="+mn-lt"/>
-                <a:cs typeface="+mn-lt"/>
-              </a:rPr>
-              <a:t>that</a:t>
-            </a:r>
-            <a:r>
-              <a:rPr lang="sv-SE" sz="1000" i="1" dirty="0">
-                <a:ea typeface="+mn-lt"/>
-                <a:cs typeface="+mn-lt"/>
-              </a:rPr>
-              <a:t> </a:t>
-            </a:r>
-            <a:r>
-              <a:rPr lang="sv-SE" sz="1000" i="1" dirty="0" err="1">
-                <a:ea typeface="+mn-lt"/>
-                <a:cs typeface="+mn-lt"/>
-              </a:rPr>
-              <a:t>aims</a:t>
-            </a:r>
-            <a:r>
-              <a:rPr lang="sv-SE" sz="1000" i="1" dirty="0">
-                <a:ea typeface="+mn-lt"/>
-                <a:cs typeface="+mn-lt"/>
-              </a:rPr>
-              <a:t> to </a:t>
-            </a:r>
-            <a:r>
-              <a:rPr lang="sv-SE" sz="1000" i="1" dirty="0" err="1">
-                <a:ea typeface="+mn-lt"/>
-                <a:cs typeface="+mn-lt"/>
-              </a:rPr>
-              <a:t>create</a:t>
-            </a:r>
-            <a:r>
-              <a:rPr lang="sv-SE" sz="1000" i="1" dirty="0">
-                <a:ea typeface="+mn-lt"/>
-                <a:cs typeface="+mn-lt"/>
-              </a:rPr>
-              <a:t> a </a:t>
-            </a:r>
-            <a:r>
-              <a:rPr lang="sv-SE" sz="1000" i="1" dirty="0" err="1">
-                <a:ea typeface="+mn-lt"/>
-                <a:cs typeface="+mn-lt"/>
-              </a:rPr>
-              <a:t>more</a:t>
-            </a:r>
-            <a:r>
-              <a:rPr lang="sv-SE" sz="1000" i="1" dirty="0">
-                <a:ea typeface="+mn-lt"/>
-                <a:cs typeface="+mn-lt"/>
-              </a:rPr>
-              <a:t> </a:t>
-            </a:r>
-            <a:r>
-              <a:rPr lang="sv-SE" sz="1000" i="1" dirty="0" err="1">
-                <a:ea typeface="+mn-lt"/>
-                <a:cs typeface="+mn-lt"/>
-              </a:rPr>
-              <a:t>open</a:t>
-            </a:r>
-            <a:r>
-              <a:rPr lang="sv-SE" sz="1000" i="1" dirty="0">
-                <a:ea typeface="+mn-lt"/>
-                <a:cs typeface="+mn-lt"/>
-              </a:rPr>
-              <a:t> </a:t>
-            </a:r>
-            <a:r>
-              <a:rPr lang="sv-SE" sz="1000" i="1" dirty="0" err="1">
-                <a:ea typeface="+mn-lt"/>
-                <a:cs typeface="+mn-lt"/>
-              </a:rPr>
-              <a:t>work</a:t>
-            </a:r>
-            <a:r>
-              <a:rPr lang="sv-SE" sz="1000" i="1" dirty="0">
-                <a:ea typeface="+mn-lt"/>
-                <a:cs typeface="+mn-lt"/>
-              </a:rPr>
-              <a:t> </a:t>
-            </a:r>
-            <a:r>
-              <a:rPr lang="sv-SE" sz="1000" i="1" dirty="0" err="1">
-                <a:ea typeface="+mn-lt"/>
-                <a:cs typeface="+mn-lt"/>
-              </a:rPr>
-              <a:t>environment</a:t>
-            </a:r>
-            <a:r>
-              <a:rPr lang="sv-SE" sz="1000" i="1" dirty="0">
-                <a:ea typeface="+mn-lt"/>
-                <a:cs typeface="+mn-lt"/>
-              </a:rPr>
-              <a:t> and </a:t>
-            </a:r>
-            <a:r>
-              <a:rPr lang="sv-SE" sz="1000" i="1" dirty="0" err="1">
-                <a:ea typeface="+mn-lt"/>
-                <a:cs typeface="+mn-lt"/>
-              </a:rPr>
-              <a:t>raise</a:t>
-            </a:r>
-            <a:r>
-              <a:rPr lang="sv-SE" sz="1000" i="1" dirty="0">
-                <a:ea typeface="+mn-lt"/>
-                <a:cs typeface="+mn-lt"/>
-              </a:rPr>
-              <a:t> </a:t>
-            </a:r>
-            <a:r>
-              <a:rPr lang="sv-SE" sz="1000" i="1" dirty="0" err="1">
-                <a:ea typeface="+mn-lt"/>
-                <a:cs typeface="+mn-lt"/>
-              </a:rPr>
-              <a:t>awareness</a:t>
-            </a:r>
-            <a:r>
-              <a:rPr lang="sv-SE" sz="1000" i="1" dirty="0">
-                <a:ea typeface="+mn-lt"/>
-                <a:cs typeface="+mn-lt"/>
-              </a:rPr>
-              <a:t> </a:t>
-            </a:r>
-            <a:r>
-              <a:rPr lang="sv-SE" sz="1000" i="1" dirty="0" err="1">
-                <a:ea typeface="+mn-lt"/>
-                <a:cs typeface="+mn-lt"/>
-              </a:rPr>
-              <a:t>about</a:t>
-            </a:r>
-            <a:r>
-              <a:rPr lang="sv-SE" sz="1000" i="1" dirty="0">
-                <a:ea typeface="+mn-lt"/>
-                <a:cs typeface="+mn-lt"/>
-              </a:rPr>
-              <a:t> different </a:t>
-            </a:r>
-            <a:r>
-              <a:rPr lang="sv-SE" sz="1000" i="1" dirty="0" err="1">
-                <a:ea typeface="+mn-lt"/>
-                <a:cs typeface="+mn-lt"/>
-              </a:rPr>
-              <a:t>topics</a:t>
-            </a:r>
-            <a:r>
-              <a:rPr lang="sv-SE" sz="1000" i="1" dirty="0">
-                <a:ea typeface="+mn-lt"/>
-                <a:cs typeface="+mn-lt"/>
-              </a:rPr>
-              <a:t> </a:t>
-            </a:r>
-            <a:r>
-              <a:rPr lang="sv-SE" sz="1000" i="1" dirty="0" err="1">
-                <a:ea typeface="+mn-lt"/>
-                <a:cs typeface="+mn-lt"/>
-              </a:rPr>
-              <a:t>aimed</a:t>
-            </a:r>
-            <a:r>
-              <a:rPr lang="sv-SE" sz="1000" i="1" dirty="0">
-                <a:ea typeface="+mn-lt"/>
-                <a:cs typeface="+mn-lt"/>
-              </a:rPr>
-              <a:t> at LGBTQ+</a:t>
-            </a:r>
-            <a:r>
-              <a:rPr lang="sv-SE" sz="1000" dirty="0">
-                <a:ea typeface="+mn-lt"/>
-                <a:cs typeface="+mn-lt"/>
-              </a:rPr>
-              <a:t> </a:t>
-            </a:r>
+            <a:endParaRPr lang="sv-SE" sz="1000" i="1" dirty="0">
+              <a:ea typeface="+mn-lt"/>
+              <a:cs typeface="+mn-lt"/>
+            </a:endParaRPr>
           </a:p>
           <a:p>
             <a:pPr marL="285750" indent="-285750">
               <a:buFont typeface="Arial"/>
               <a:buChar char="•"/>
             </a:pPr>
-            <a:r>
-              <a:rPr lang="sv-SE" sz="1000" i="1" dirty="0" err="1">
-                <a:ea typeface="+mn-lt"/>
-                <a:cs typeface="+mn-lt"/>
-              </a:rPr>
-              <a:t>Have</a:t>
-            </a:r>
-            <a:r>
-              <a:rPr lang="sv-SE" sz="1000" i="1" dirty="0">
-                <a:ea typeface="+mn-lt"/>
-                <a:cs typeface="+mn-lt"/>
-              </a:rPr>
-              <a:t> ambitions of gender </a:t>
-            </a:r>
-            <a:r>
-              <a:rPr lang="sv-SE" sz="1000" i="1" dirty="0" err="1">
-                <a:ea typeface="+mn-lt"/>
-                <a:cs typeface="+mn-lt"/>
-              </a:rPr>
-              <a:t>parity</a:t>
-            </a:r>
-            <a:r>
-              <a:rPr lang="sv-SE" sz="1000" i="1" dirty="0">
-                <a:ea typeface="+mn-lt"/>
-                <a:cs typeface="+mn-lt"/>
-              </a:rPr>
-              <a:t> </a:t>
-            </a:r>
-            <a:r>
-              <a:rPr lang="sv-SE" sz="1000" i="1" dirty="0" err="1">
-                <a:ea typeface="+mn-lt"/>
-                <a:cs typeface="+mn-lt"/>
-              </a:rPr>
-              <a:t>across</a:t>
-            </a:r>
-            <a:r>
-              <a:rPr lang="sv-SE" sz="1000" i="1" dirty="0">
-                <a:ea typeface="+mn-lt"/>
-                <a:cs typeface="+mn-lt"/>
-              </a:rPr>
-              <a:t> all management </a:t>
-            </a:r>
-            <a:r>
-              <a:rPr lang="sv-SE" sz="1000" i="1" dirty="0" err="1">
-                <a:ea typeface="+mn-lt"/>
-                <a:cs typeface="+mn-lt"/>
-              </a:rPr>
-              <a:t>levels</a:t>
-            </a:r>
-            <a:r>
-              <a:rPr lang="sv-SE" sz="1000" i="1" dirty="0">
-                <a:ea typeface="+mn-lt"/>
-                <a:cs typeface="+mn-lt"/>
-              </a:rPr>
-              <a:t> 2025</a:t>
-            </a:r>
-            <a:r>
-              <a:rPr lang="sv-SE" sz="1000" dirty="0">
-                <a:ea typeface="+mn-lt"/>
-                <a:cs typeface="+mn-lt"/>
-              </a:rPr>
-              <a:t> </a:t>
-            </a:r>
+            <a:endParaRPr lang="sv-SE" sz="1000" i="1" dirty="0">
+              <a:ea typeface="+mn-lt"/>
+              <a:cs typeface="+mn-lt"/>
+            </a:endParaRPr>
           </a:p>
           <a:p>
             <a:pPr marL="285750" indent="-285750">
               <a:buFont typeface="Arial"/>
               <a:buChar char="•"/>
             </a:pPr>
-            <a:r>
-              <a:rPr lang="sv-SE" sz="1000" dirty="0">
-                <a:ea typeface="+mn-lt"/>
-                <a:cs typeface="+mn-lt"/>
-              </a:rPr>
-              <a:t>Has partnership </a:t>
-            </a:r>
-            <a:r>
-              <a:rPr lang="sv-SE" sz="1000" dirty="0" err="1">
-                <a:ea typeface="+mn-lt"/>
-                <a:cs typeface="+mn-lt"/>
-              </a:rPr>
-              <a:t>with</a:t>
-            </a:r>
-            <a:r>
-              <a:rPr lang="sv-SE" sz="1000" dirty="0">
-                <a:ea typeface="+mn-lt"/>
-                <a:cs typeface="+mn-lt"/>
-              </a:rPr>
-              <a:t> </a:t>
-            </a:r>
-            <a:r>
-              <a:rPr lang="sv-SE" sz="1000" dirty="0" err="1">
-                <a:ea typeface="+mn-lt"/>
-                <a:cs typeface="+mn-lt"/>
-              </a:rPr>
-              <a:t>ability:IN</a:t>
-            </a:r>
-            <a:r>
-              <a:rPr lang="sv-SE" sz="1000" dirty="0">
-                <a:ea typeface="+mn-lt"/>
-                <a:cs typeface="+mn-lt"/>
-              </a:rPr>
-              <a:t> to </a:t>
-            </a:r>
-            <a:r>
-              <a:rPr lang="sv-SE" sz="1000" dirty="0" err="1">
-                <a:ea typeface="+mn-lt"/>
-                <a:cs typeface="+mn-lt"/>
-              </a:rPr>
-              <a:t>accelerate</a:t>
-            </a:r>
-            <a:r>
-              <a:rPr lang="sv-SE" sz="1000" dirty="0">
-                <a:ea typeface="+mn-lt"/>
-                <a:cs typeface="+mn-lt"/>
-              </a:rPr>
-              <a:t> the </a:t>
-            </a:r>
-            <a:r>
-              <a:rPr lang="sv-SE" sz="1000" dirty="0" err="1">
-                <a:ea typeface="+mn-lt"/>
-                <a:cs typeface="+mn-lt"/>
-              </a:rPr>
-              <a:t>inclusion</a:t>
-            </a:r>
-            <a:r>
-              <a:rPr lang="sv-SE" sz="1000" dirty="0">
-                <a:ea typeface="+mn-lt"/>
-                <a:cs typeface="+mn-lt"/>
-              </a:rPr>
-              <a:t> of </a:t>
-            </a:r>
-            <a:r>
-              <a:rPr lang="sv-SE" sz="1000" dirty="0" err="1">
-                <a:ea typeface="+mn-lt"/>
-                <a:cs typeface="+mn-lt"/>
-              </a:rPr>
-              <a:t>people</a:t>
-            </a:r>
-            <a:r>
-              <a:rPr lang="sv-SE" sz="1000" dirty="0">
-                <a:ea typeface="+mn-lt"/>
-                <a:cs typeface="+mn-lt"/>
-              </a:rPr>
-              <a:t> </a:t>
-            </a:r>
-            <a:r>
-              <a:rPr lang="sv-SE" sz="1000" dirty="0" err="1">
-                <a:ea typeface="+mn-lt"/>
-                <a:cs typeface="+mn-lt"/>
-              </a:rPr>
-              <a:t>with</a:t>
-            </a:r>
-            <a:r>
-              <a:rPr lang="sv-SE" sz="1000" dirty="0">
-                <a:ea typeface="+mn-lt"/>
-                <a:cs typeface="+mn-lt"/>
-              </a:rPr>
-              <a:t> </a:t>
-            </a:r>
-            <a:r>
-              <a:rPr lang="sv-SE" sz="1000" dirty="0" err="1">
-                <a:ea typeface="+mn-lt"/>
-                <a:cs typeface="+mn-lt"/>
-              </a:rPr>
-              <a:t>disabilities</a:t>
-            </a:r>
-            <a:r>
-              <a:rPr lang="sv-SE" sz="1000" dirty="0">
-                <a:ea typeface="+mn-lt"/>
-                <a:cs typeface="+mn-lt"/>
-              </a:rPr>
-              <a:t> </a:t>
-            </a:r>
+            <a:endParaRPr lang="sv-SE" sz="1000" i="1" dirty="0">
+              <a:ea typeface="+mn-lt"/>
+              <a:cs typeface="+mn-lt"/>
+            </a:endParaRPr>
+          </a:p>
+          <a:p>
+            <a:endParaRPr lang="sv-SE" sz="1000" i="1" dirty="0">
+              <a:ea typeface="+mn-lt"/>
+              <a:cs typeface="+mn-lt"/>
+            </a:endParaRPr>
           </a:p>
           <a:p>
             <a:pPr marL="285750" indent="-285750">
               <a:buFont typeface="Arial"/>
               <a:buChar char="•"/>
             </a:pPr>
-            <a:r>
-              <a:rPr lang="sv-SE" sz="1000" dirty="0" err="1">
-                <a:ea typeface="+mn-lt"/>
-                <a:cs typeface="+mn-lt"/>
-              </a:rPr>
-              <a:t>Encourage</a:t>
-            </a:r>
-            <a:r>
-              <a:rPr lang="sv-SE" sz="1000" dirty="0">
-                <a:ea typeface="+mn-lt"/>
-                <a:cs typeface="+mn-lt"/>
-              </a:rPr>
-              <a:t> </a:t>
-            </a:r>
-            <a:r>
-              <a:rPr lang="sv-SE" sz="1000" dirty="0" err="1">
-                <a:ea typeface="+mn-lt"/>
-                <a:cs typeface="+mn-lt"/>
-              </a:rPr>
-              <a:t>lifelong</a:t>
-            </a:r>
-            <a:r>
-              <a:rPr lang="sv-SE" sz="1000" dirty="0">
-                <a:ea typeface="+mn-lt"/>
-                <a:cs typeface="+mn-lt"/>
-              </a:rPr>
-              <a:t> </a:t>
-            </a:r>
-            <a:r>
-              <a:rPr lang="sv-SE" sz="1000" dirty="0" err="1">
-                <a:ea typeface="+mn-lt"/>
-                <a:cs typeface="+mn-lt"/>
-              </a:rPr>
-              <a:t>learning</a:t>
-            </a:r>
-            <a:r>
-              <a:rPr lang="sv-SE" sz="1000" dirty="0">
-                <a:ea typeface="+mn-lt"/>
-                <a:cs typeface="+mn-lt"/>
-              </a:rPr>
-              <a:t> to bridge the gap </a:t>
-            </a:r>
-            <a:r>
-              <a:rPr lang="sv-SE" sz="1000" dirty="0" err="1">
-                <a:ea typeface="+mn-lt"/>
-                <a:cs typeface="+mn-lt"/>
-              </a:rPr>
-              <a:t>between</a:t>
-            </a:r>
-            <a:r>
-              <a:rPr lang="sv-SE" sz="1000" dirty="0">
-                <a:ea typeface="+mn-lt"/>
-                <a:cs typeface="+mn-lt"/>
-              </a:rPr>
-              <a:t> generations. </a:t>
-            </a:r>
+            <a:endParaRPr lang="sv-SE" sz="1000" i="1" dirty="0">
+              <a:ea typeface="+mn-lt"/>
+              <a:cs typeface="+mn-lt"/>
+            </a:endParaRPr>
+          </a:p>
+          <a:p>
+            <a:pPr marL="285750" indent="-285750">
+              <a:buFont typeface="Arial"/>
+              <a:buChar char="•"/>
+            </a:pPr>
+            <a:endParaRPr lang="sv-SE" sz="1000" i="1" dirty="0">
+              <a:ea typeface="+mn-lt"/>
+              <a:cs typeface="+mn-lt"/>
+            </a:endParaRPr>
+          </a:p>
+          <a:p>
+            <a:pPr marL="285750" indent="-285750">
+              <a:buFont typeface="Arial"/>
+              <a:buChar char="•"/>
+            </a:pPr>
+            <a:endParaRPr lang="sv-SE" sz="1000" i="1" dirty="0">
+              <a:ea typeface="+mn-lt"/>
+              <a:cs typeface="+mn-lt"/>
+            </a:endParaRPr>
+          </a:p>
+          <a:p>
+            <a:pPr marL="285750" indent="-285750">
+              <a:buFont typeface="Arial"/>
+              <a:buChar char="•"/>
+            </a:pPr>
+            <a:endParaRPr lang="sv-SE" sz="1000" i="1" dirty="0">
+              <a:ea typeface="+mn-lt"/>
+              <a:cs typeface="+mn-lt"/>
+            </a:endParaRPr>
+          </a:p>
+          <a:p>
+            <a:pPr marL="285750" indent="-285750">
+              <a:buFont typeface="Arial"/>
+              <a:buChar char="•"/>
+            </a:pPr>
+            <a:endParaRPr lang="sv-SE" sz="1000" i="1" dirty="0">
+              <a:ea typeface="+mn-lt"/>
+              <a:cs typeface="+mn-lt"/>
+            </a:endParaRPr>
+          </a:p>
+          <a:p>
+            <a:pPr marL="285750" indent="-285750">
+              <a:buFont typeface="Arial"/>
+              <a:buChar char="•"/>
+            </a:pPr>
+            <a:endParaRPr lang="sv-SE" sz="1000" i="1" dirty="0">
+              <a:ea typeface="+mn-lt"/>
+              <a:cs typeface="+mn-lt"/>
+            </a:endParaRPr>
+          </a:p>
+          <a:p>
+            <a:pPr marL="285750" indent="-285750">
+              <a:buFont typeface="Arial"/>
+              <a:buChar char="•"/>
+            </a:pPr>
+            <a:endParaRPr lang="sv-SE" sz="1000" i="1" dirty="0">
+              <a:ea typeface="+mn-lt"/>
+              <a:cs typeface="+mn-lt"/>
+            </a:endParaRPr>
+          </a:p>
+          <a:p>
+            <a:pPr marL="285750" indent="-285750">
+              <a:buFont typeface="Arial"/>
+              <a:buChar char="•"/>
+            </a:pPr>
+            <a:endParaRPr lang="sv-SE" sz="1000" i="1" dirty="0">
+              <a:ea typeface="+mn-lt"/>
+              <a:cs typeface="+mn-lt"/>
+            </a:endParaRPr>
+          </a:p>
+          <a:p>
+            <a:pPr marL="285750" indent="-285750">
+              <a:buFont typeface="Arial"/>
+              <a:buChar char="•"/>
+            </a:pPr>
+            <a:endParaRPr lang="sv-SE" sz="1000" i="1" dirty="0">
+              <a:ea typeface="+mn-lt"/>
+              <a:cs typeface="+mn-lt"/>
+            </a:endParaRPr>
+          </a:p>
+          <a:p>
+            <a:pPr marL="285750" indent="-285750">
+              <a:buFont typeface="Arial"/>
+              <a:buChar char="•"/>
+            </a:pPr>
+            <a:endParaRPr lang="sv-SE" sz="1000" i="1" dirty="0">
+              <a:ea typeface="+mn-lt"/>
+              <a:cs typeface="+mn-lt"/>
+            </a:endParaRPr>
+          </a:p>
+          <a:p>
+            <a:pPr marL="285750" indent="-285750">
+              <a:buFont typeface="Arial"/>
+              <a:buChar char="•"/>
+            </a:pPr>
+            <a:endParaRPr lang="sv-SE" sz="1000" i="1" dirty="0">
+              <a:ea typeface="+mn-lt"/>
+              <a:cs typeface="+mn-lt"/>
+            </a:endParaRPr>
+          </a:p>
+          <a:p>
+            <a:pPr marL="285750" indent="-285750">
+              <a:buFont typeface="Arial"/>
+              <a:buChar char="•"/>
+            </a:pPr>
+            <a:endParaRPr lang="sv-SE" sz="1000" i="1" dirty="0">
+              <a:ea typeface="+mn-lt"/>
+              <a:cs typeface="+mn-lt"/>
+            </a:endParaRPr>
+          </a:p>
+          <a:p>
+            <a:pPr marL="285750" indent="-285750">
+              <a:buFont typeface="Arial"/>
+              <a:buChar char="•"/>
+            </a:pPr>
+            <a:endParaRPr lang="sv-SE" sz="1000" i="1" dirty="0">
+              <a:ea typeface="+mn-lt"/>
+              <a:cs typeface="+mn-lt"/>
+            </a:endParaRPr>
+          </a:p>
+          <a:p>
+            <a:pPr marL="285750" indent="-285750">
+              <a:buFont typeface="Arial"/>
+              <a:buChar char="•"/>
+            </a:pPr>
+            <a:endParaRPr lang="sv-SE" sz="1000" i="1" dirty="0">
+              <a:ea typeface="+mn-lt"/>
+              <a:cs typeface="+mn-lt"/>
+            </a:endParaRPr>
+          </a:p>
+          <a:p>
+            <a:pPr marL="285750" indent="-285750">
+              <a:buFont typeface="Arial"/>
+              <a:buChar char="•"/>
+            </a:pPr>
+            <a:endParaRPr lang="sv-SE" sz="1000" i="1" dirty="0">
+              <a:ea typeface="+mn-lt"/>
+              <a:cs typeface="+mn-lt"/>
+            </a:endParaRPr>
+          </a:p>
+          <a:p>
+            <a:pPr marL="285750" indent="-285750">
+              <a:buFont typeface="Arial"/>
+              <a:buChar char="•"/>
+            </a:pPr>
+            <a:endParaRPr lang="sv-SE" sz="1000" i="1" dirty="0">
+              <a:ea typeface="+mn-lt"/>
+              <a:cs typeface="+mn-lt"/>
+            </a:endParaRPr>
+          </a:p>
+          <a:p>
+            <a:pPr marL="285750" indent="-285750">
+              <a:buFont typeface="Arial"/>
+              <a:buChar char="•"/>
+            </a:pPr>
+            <a:endParaRPr lang="sv-SE" sz="1000" i="1" dirty="0">
+              <a:ea typeface="+mn-lt"/>
+              <a:cs typeface="+mn-lt"/>
+            </a:endParaRPr>
+          </a:p>
+          <a:p>
+            <a:pPr marL="285750" indent="-285750">
+              <a:buFont typeface="Arial"/>
+              <a:buChar char="•"/>
+            </a:pPr>
+            <a:endParaRPr lang="sv-SE" sz="1000" i="1" dirty="0">
+              <a:ea typeface="+mn-lt"/>
+              <a:cs typeface="+mn-lt"/>
+            </a:endParaRPr>
+          </a:p>
+          <a:p>
+            <a:pPr marL="285750" indent="-285750">
+              <a:buFont typeface="Arial"/>
+              <a:buChar char="•"/>
+            </a:pPr>
+            <a:endParaRPr lang="sv-SE" sz="1000" i="1" dirty="0">
+              <a:ea typeface="+mn-lt"/>
+              <a:cs typeface="+mn-lt"/>
+            </a:endParaRPr>
+          </a:p>
+          <a:p>
+            <a:pPr marL="285750" indent="-285750">
+              <a:buFont typeface="Arial"/>
+              <a:buChar char="•"/>
+            </a:pPr>
+            <a:endParaRPr lang="sv-SE" sz="1000" i="1" dirty="0">
+              <a:ea typeface="+mn-lt"/>
+              <a:cs typeface="+mn-lt"/>
+            </a:endParaRPr>
+          </a:p>
+          <a:p>
+            <a:pPr marL="285750" indent="-285750">
+              <a:buFont typeface="Arial"/>
+              <a:buChar char="•"/>
+            </a:pPr>
+            <a:endParaRPr lang="sv-SE" sz="1000" i="1" dirty="0">
+              <a:ea typeface="+mn-lt"/>
+              <a:cs typeface="+mn-lt"/>
+            </a:endParaRPr>
           </a:p>
           <a:p>
             <a:pPr marL="285750" indent="-285750">
@@ -6998,10 +6238,6 @@
             </a:endParaRPr>
           </a:p>
           <a:p>
-            <a:pPr marL="285750" indent="-285750">
-              <a:buFont typeface="Arial"/>
-              <a:buChar char="•"/>
-            </a:pPr>
             <a:endParaRPr lang="sv-SE" sz="1000" dirty="0">
               <a:ea typeface="Calibri"/>
               <a:cs typeface="Calibri"/>
@@ -7017,7 +6253,7 @@
       </p:sp>
       <p:sp>
         <p:nvSpPr>
-          <p:cNvPr id="21" name="TextBox 20">
+          <p:cNvPr id="21" name="Governance">
             <a:extLst>
               <a:ext uri="{FF2B5EF4-FFF2-40B4-BE49-F238E27FC236}">
                 <a16:creationId xmlns:a16="http://schemas.microsoft.com/office/drawing/2014/main" id="{5749F089-D1F1-2D1B-B890-ABB701F7879A}"/>
@@ -7030,7 +6266,7 @@
         <p:spPr>
           <a:xfrm>
             <a:off x="10435523" y="625892"/>
-            <a:ext cx="1517216" cy="5755422"/>
+            <a:ext cx="1517216" cy="5909310"/>
           </a:xfrm>
           <a:prstGeom prst="rect">
             <a:avLst/>
@@ -7051,12 +6287,39 @@
           <a:lstStyle/>
           <a:p>
             <a:r>
-              <a:rPr lang="sv-SE" b="1" err="1"/>
+              <a:rPr lang="sv-SE" b="1" dirty="0" err="1"/>
               <a:t>Governance</a:t>
             </a:r>
-            <a:endParaRPr lang="sv-SE" b="1" err="1">
+            <a:endParaRPr lang="sv-SE" b="1" dirty="0">
               <a:ea typeface="Calibri"/>
               <a:cs typeface="Calibri"/>
+            </a:endParaRPr>
+          </a:p>
+          <a:p>
+            <a:r>
+              <a:rPr lang="sv-SE" sz="1000" dirty="0">
+                <a:ea typeface="+mn-lt"/>
+                <a:cs typeface="+mn-lt"/>
+              </a:rPr>
+              <a:t>[[</a:t>
+            </a:r>
+            <a:r>
+              <a:rPr lang="sv-SE" sz="1000" dirty="0" err="1">
+                <a:ea typeface="+mn-lt"/>
+                <a:cs typeface="+mn-lt"/>
+              </a:rPr>
+              <a:t>governance</a:t>
+            </a:r>
+            <a:r>
+              <a:rPr lang="sv-SE" sz="1000" dirty="0">
+                <a:ea typeface="+mn-lt"/>
+                <a:cs typeface="+mn-lt"/>
+              </a:rPr>
+              <a:t>]]</a:t>
+            </a:r>
+            <a:endParaRPr lang="sv-SE" sz="1000" dirty="0">
+              <a:ea typeface="Calibri" panose="020F0502020204030204"/>
+              <a:cs typeface="Calibri" panose="020F0502020204030204"/>
             </a:endParaRPr>
           </a:p>
           <a:p>
@@ -7064,156 +6327,9 @@
               <a:buFont typeface="Arial"/>
               <a:buChar char="•"/>
             </a:pPr>
-            <a:r>
-              <a:rPr lang="sv-SE" sz="1000">
-                <a:ea typeface="+mn-lt"/>
-                <a:cs typeface="+mn-lt"/>
-              </a:rPr>
-              <a:t>Henkel </a:t>
-            </a:r>
-            <a:r>
-              <a:rPr lang="sv-SE" sz="1000" err="1">
-                <a:ea typeface="+mn-lt"/>
-                <a:cs typeface="+mn-lt"/>
-              </a:rPr>
-              <a:t>have</a:t>
-            </a:r>
-            <a:r>
-              <a:rPr lang="sv-SE" sz="1000">
-                <a:ea typeface="+mn-lt"/>
-                <a:cs typeface="+mn-lt"/>
-              </a:rPr>
-              <a:t> an extensive </a:t>
-            </a:r>
-            <a:r>
-              <a:rPr lang="sv-SE" sz="1000" err="1">
-                <a:ea typeface="+mn-lt"/>
-                <a:cs typeface="+mn-lt"/>
-              </a:rPr>
-              <a:t>sustainability</a:t>
-            </a:r>
-            <a:r>
-              <a:rPr lang="sv-SE" sz="1000">
-                <a:ea typeface="+mn-lt"/>
-                <a:cs typeface="+mn-lt"/>
-              </a:rPr>
-              <a:t> </a:t>
-            </a:r>
-            <a:r>
-              <a:rPr lang="sv-SE" sz="1000" err="1">
-                <a:ea typeface="+mn-lt"/>
-                <a:cs typeface="+mn-lt"/>
-              </a:rPr>
-              <a:t>strategy</a:t>
-            </a:r>
-            <a:r>
-              <a:rPr lang="sv-SE" sz="1000">
-                <a:ea typeface="+mn-lt"/>
-                <a:cs typeface="+mn-lt"/>
-              </a:rPr>
-              <a:t> and a </a:t>
-            </a:r>
-            <a:r>
-              <a:rPr lang="sv-SE" sz="1000" err="1">
-                <a:ea typeface="+mn-lt"/>
-                <a:cs typeface="+mn-lt"/>
-              </a:rPr>
-              <a:t>sustainability</a:t>
-            </a:r>
-            <a:r>
-              <a:rPr lang="sv-SE" sz="1000">
-                <a:ea typeface="+mn-lt"/>
-                <a:cs typeface="+mn-lt"/>
-              </a:rPr>
-              <a:t> board </a:t>
-            </a:r>
-            <a:r>
-              <a:rPr lang="sv-SE" sz="1000" err="1">
-                <a:ea typeface="+mn-lt"/>
-                <a:cs typeface="+mn-lt"/>
-              </a:rPr>
-              <a:t>that</a:t>
-            </a:r>
-            <a:r>
-              <a:rPr lang="sv-SE" sz="1000">
-                <a:ea typeface="+mn-lt"/>
-                <a:cs typeface="+mn-lt"/>
-              </a:rPr>
-              <a:t> has extensive </a:t>
-            </a:r>
-            <a:r>
-              <a:rPr lang="sv-SE" sz="1000" err="1">
-                <a:ea typeface="+mn-lt"/>
-                <a:cs typeface="+mn-lt"/>
-              </a:rPr>
-              <a:t>knowledge</a:t>
-            </a:r>
-            <a:r>
-              <a:rPr lang="sv-SE" sz="1000">
-                <a:ea typeface="+mn-lt"/>
-                <a:cs typeface="+mn-lt"/>
-              </a:rPr>
-              <a:t> in </a:t>
-            </a:r>
-            <a:r>
-              <a:rPr lang="sv-SE" sz="1000" err="1">
-                <a:ea typeface="+mn-lt"/>
-                <a:cs typeface="+mn-lt"/>
-              </a:rPr>
-              <a:t>how</a:t>
-            </a:r>
-            <a:r>
-              <a:rPr lang="sv-SE" sz="1000">
-                <a:ea typeface="+mn-lt"/>
-                <a:cs typeface="+mn-lt"/>
-              </a:rPr>
-              <a:t> to </a:t>
-            </a:r>
-            <a:r>
-              <a:rPr lang="sv-SE" sz="1000" err="1">
-                <a:ea typeface="+mn-lt"/>
-                <a:cs typeface="+mn-lt"/>
-              </a:rPr>
-              <a:t>move</a:t>
-            </a:r>
-            <a:r>
-              <a:rPr lang="sv-SE" sz="1000">
-                <a:ea typeface="+mn-lt"/>
-                <a:cs typeface="+mn-lt"/>
-              </a:rPr>
-              <a:t> forward </a:t>
-            </a:r>
-            <a:r>
-              <a:rPr lang="sv-SE" sz="1000" err="1">
-                <a:ea typeface="+mn-lt"/>
-                <a:cs typeface="+mn-lt"/>
-              </a:rPr>
-              <a:t>with</a:t>
-            </a:r>
-            <a:r>
-              <a:rPr lang="sv-SE" sz="1000">
-                <a:ea typeface="+mn-lt"/>
-                <a:cs typeface="+mn-lt"/>
-              </a:rPr>
-              <a:t> </a:t>
-            </a:r>
-            <a:r>
-              <a:rPr lang="sv-SE" sz="1000" err="1">
-                <a:ea typeface="+mn-lt"/>
-                <a:cs typeface="+mn-lt"/>
-              </a:rPr>
-              <a:t>sustainability</a:t>
-            </a:r>
-            <a:r>
-              <a:rPr lang="sv-SE" sz="1000">
-                <a:ea typeface="+mn-lt"/>
-                <a:cs typeface="+mn-lt"/>
-              </a:rPr>
-              <a:t> </a:t>
-            </a:r>
-            <a:endParaRPr lang="sv-SE" sz="1000">
-              <a:ea typeface="Calibri"/>
-              <a:cs typeface="Calibri"/>
+            <a:endParaRPr lang="sv-SE" sz="1000" dirty="0">
+              <a:ea typeface="Calibri" panose="020F0502020204030204"/>
+              <a:cs typeface="Calibri" panose="020F0502020204030204"/>
             </a:endParaRPr>
           </a:p>
           <a:p>
@@ -7221,544 +6337,209 @@
               <a:buFont typeface="Arial"/>
               <a:buChar char="•"/>
             </a:pPr>
-            <a:r>
-              <a:rPr lang="sv-SE" sz="1000">
-                <a:ea typeface="+mn-lt"/>
-                <a:cs typeface="+mn-lt"/>
-              </a:rPr>
-              <a:t>The </a:t>
-            </a:r>
-            <a:r>
-              <a:rPr lang="sv-SE" sz="1000" err="1">
-                <a:ea typeface="+mn-lt"/>
-                <a:cs typeface="+mn-lt"/>
-              </a:rPr>
-              <a:t>company</a:t>
-            </a:r>
-            <a:r>
-              <a:rPr lang="sv-SE" sz="1000">
-                <a:ea typeface="+mn-lt"/>
-                <a:cs typeface="+mn-lt"/>
-              </a:rPr>
-              <a:t> </a:t>
-            </a:r>
-            <a:r>
-              <a:rPr lang="sv-SE" sz="1000" err="1">
-                <a:latin typeface="Times New Roman"/>
-                <a:cs typeface="Times New Roman"/>
-              </a:rPr>
-              <a:t>seem</a:t>
-            </a:r>
-            <a:r>
-              <a:rPr lang="sv-SE" sz="1000">
-                <a:latin typeface="Times New Roman"/>
-                <a:cs typeface="Times New Roman"/>
-              </a:rPr>
-              <a:t> to </a:t>
-            </a:r>
-            <a:r>
-              <a:rPr lang="sv-SE" sz="1000" err="1">
-                <a:latin typeface="Times New Roman"/>
-                <a:cs typeface="Times New Roman"/>
-              </a:rPr>
-              <a:t>have</a:t>
-            </a:r>
-            <a:r>
-              <a:rPr lang="sv-SE" sz="1000">
-                <a:latin typeface="Times New Roman"/>
-                <a:cs typeface="Times New Roman"/>
-              </a:rPr>
-              <a:t> a </a:t>
-            </a:r>
-            <a:r>
-              <a:rPr lang="sv-SE" sz="1000" err="1">
-                <a:latin typeface="Times New Roman"/>
-                <a:cs typeface="Times New Roman"/>
-              </a:rPr>
-              <a:t>good</a:t>
-            </a:r>
-            <a:r>
-              <a:rPr lang="sv-SE" sz="1000">
-                <a:latin typeface="Times New Roman"/>
-                <a:cs typeface="Times New Roman"/>
-              </a:rPr>
-              <a:t> and </a:t>
-            </a:r>
-            <a:r>
-              <a:rPr lang="sv-SE" sz="1000" err="1">
-                <a:latin typeface="Times New Roman"/>
-                <a:cs typeface="Times New Roman"/>
-              </a:rPr>
-              <a:t>correct</a:t>
-            </a:r>
-            <a:r>
-              <a:rPr lang="sv-SE" sz="1000">
-                <a:latin typeface="Times New Roman"/>
-                <a:cs typeface="Times New Roman"/>
-              </a:rPr>
-              <a:t> </a:t>
-            </a:r>
-            <a:r>
-              <a:rPr lang="sv-SE" sz="1000" err="1">
-                <a:latin typeface="Times New Roman"/>
-                <a:cs typeface="Times New Roman"/>
-              </a:rPr>
-              <a:t>way</a:t>
-            </a:r>
-            <a:r>
-              <a:rPr lang="sv-SE" sz="1000">
-                <a:latin typeface="Times New Roman"/>
-                <a:cs typeface="Times New Roman"/>
-              </a:rPr>
-              <a:t> </a:t>
-            </a:r>
-            <a:r>
-              <a:rPr lang="sv-SE" sz="1000" err="1">
-                <a:latin typeface="Times New Roman"/>
-                <a:cs typeface="Times New Roman"/>
-              </a:rPr>
-              <a:t>of</a:t>
-            </a:r>
-            <a:r>
-              <a:rPr lang="sv-SE" sz="1000">
-                <a:latin typeface="Times New Roman"/>
-                <a:cs typeface="Times New Roman"/>
-              </a:rPr>
-              <a:t> </a:t>
-            </a:r>
-            <a:r>
-              <a:rPr lang="sv-SE" sz="1000" err="1">
-                <a:latin typeface="Times New Roman"/>
-                <a:cs typeface="Times New Roman"/>
-              </a:rPr>
-              <a:t>collecting</a:t>
-            </a:r>
-            <a:r>
-              <a:rPr lang="sv-SE" sz="1000">
-                <a:latin typeface="Times New Roman"/>
-                <a:cs typeface="Times New Roman"/>
-              </a:rPr>
-              <a:t> and </a:t>
-            </a:r>
-            <a:r>
-              <a:rPr lang="sv-SE" sz="1000" err="1">
-                <a:latin typeface="Times New Roman"/>
-                <a:cs typeface="Times New Roman"/>
-              </a:rPr>
-              <a:t>analyzing</a:t>
-            </a:r>
-            <a:r>
-              <a:rPr lang="sv-SE" sz="1000">
-                <a:latin typeface="Times New Roman"/>
-                <a:cs typeface="Times New Roman"/>
-              </a:rPr>
-              <a:t> data to </a:t>
-            </a:r>
-            <a:r>
-              <a:rPr lang="sv-SE" sz="1000" err="1">
-                <a:latin typeface="Times New Roman"/>
-                <a:cs typeface="Times New Roman"/>
-              </a:rPr>
-              <a:t>keep</a:t>
-            </a:r>
-            <a:r>
-              <a:rPr lang="sv-SE" sz="1000">
-                <a:latin typeface="Times New Roman"/>
-                <a:cs typeface="Times New Roman"/>
-              </a:rPr>
-              <a:t> </a:t>
-            </a:r>
-            <a:r>
-              <a:rPr lang="sv-SE" sz="1000" err="1">
-                <a:latin typeface="Times New Roman"/>
-                <a:cs typeface="Times New Roman"/>
-              </a:rPr>
-              <a:t>track</a:t>
-            </a:r>
-            <a:r>
-              <a:rPr lang="sv-SE" sz="1000">
-                <a:latin typeface="Times New Roman"/>
-                <a:cs typeface="Times New Roman"/>
-              </a:rPr>
-              <a:t> </a:t>
-            </a:r>
-            <a:r>
-              <a:rPr lang="sv-SE" sz="1000" err="1">
-                <a:latin typeface="Times New Roman"/>
-                <a:cs typeface="Times New Roman"/>
-              </a:rPr>
-              <a:t>of</a:t>
-            </a:r>
-            <a:r>
-              <a:rPr lang="sv-SE" sz="1000">
-                <a:latin typeface="Times New Roman"/>
-                <a:cs typeface="Times New Roman"/>
-              </a:rPr>
-              <a:t> different </a:t>
-            </a:r>
-            <a:r>
-              <a:rPr lang="sv-SE" sz="1000" err="1">
-                <a:latin typeface="Times New Roman"/>
-                <a:cs typeface="Times New Roman"/>
-              </a:rPr>
-              <a:t>metrics</a:t>
-            </a:r>
-            <a:r>
-              <a:rPr lang="sv-SE" sz="1000">
-                <a:latin typeface="Times New Roman"/>
-                <a:cs typeface="Times New Roman"/>
-              </a:rPr>
-              <a:t> and </a:t>
-            </a:r>
-            <a:r>
-              <a:rPr lang="sv-SE" sz="1000" err="1">
-                <a:latin typeface="Times New Roman"/>
-                <a:cs typeface="Times New Roman"/>
-              </a:rPr>
-              <a:t>their</a:t>
-            </a:r>
-            <a:r>
-              <a:rPr lang="sv-SE" sz="1000">
-                <a:latin typeface="Times New Roman"/>
-                <a:cs typeface="Times New Roman"/>
-              </a:rPr>
-              <a:t> </a:t>
-            </a:r>
-            <a:r>
-              <a:rPr lang="sv-SE" sz="1000" err="1">
-                <a:latin typeface="Times New Roman"/>
-                <a:cs typeface="Times New Roman"/>
-              </a:rPr>
-              <a:t>sustainability</a:t>
-            </a:r>
-            <a:r>
-              <a:rPr lang="sv-SE" sz="1000">
-                <a:latin typeface="Times New Roman"/>
-                <a:cs typeface="Times New Roman"/>
-              </a:rPr>
-              <a:t> progress, </a:t>
-            </a:r>
-            <a:r>
-              <a:rPr lang="sv-SE" sz="1000" err="1">
-                <a:latin typeface="Times New Roman"/>
-                <a:cs typeface="Times New Roman"/>
-              </a:rPr>
-              <a:t>they</a:t>
-            </a:r>
-            <a:r>
-              <a:rPr lang="sv-SE" sz="1000">
-                <a:latin typeface="Times New Roman"/>
-                <a:cs typeface="Times New Roman"/>
-              </a:rPr>
-              <a:t> </a:t>
-            </a:r>
-            <a:r>
-              <a:rPr lang="sv-SE" sz="1000" err="1">
-                <a:latin typeface="Times New Roman"/>
-                <a:cs typeface="Times New Roman"/>
-              </a:rPr>
-              <a:t>also</a:t>
-            </a:r>
-            <a:r>
-              <a:rPr lang="sv-SE" sz="1000">
-                <a:latin typeface="Times New Roman"/>
-                <a:cs typeface="Times New Roman"/>
-              </a:rPr>
-              <a:t> show </a:t>
-            </a:r>
-            <a:r>
-              <a:rPr lang="sv-SE" sz="1000" err="1">
-                <a:latin typeface="Times New Roman"/>
-                <a:cs typeface="Times New Roman"/>
-              </a:rPr>
-              <a:t>their</a:t>
-            </a:r>
-            <a:r>
-              <a:rPr lang="sv-SE" sz="1000">
-                <a:latin typeface="Times New Roman"/>
-                <a:cs typeface="Times New Roman"/>
-              </a:rPr>
-              <a:t> </a:t>
-            </a:r>
-            <a:r>
-              <a:rPr lang="sv-SE" sz="1000" err="1">
-                <a:latin typeface="Times New Roman"/>
-                <a:cs typeface="Times New Roman"/>
-              </a:rPr>
-              <a:t>base</a:t>
-            </a:r>
-            <a:r>
-              <a:rPr lang="sv-SE" sz="1000">
-                <a:latin typeface="Times New Roman"/>
-                <a:cs typeface="Times New Roman"/>
-              </a:rPr>
-              <a:t> </a:t>
-            </a:r>
-            <a:r>
-              <a:rPr lang="sv-SE" sz="1000" err="1">
-                <a:latin typeface="Times New Roman"/>
-                <a:cs typeface="Times New Roman"/>
-              </a:rPr>
-              <a:t>year</a:t>
-            </a:r>
-            <a:r>
-              <a:rPr lang="sv-SE" sz="1000">
-                <a:latin typeface="Times New Roman"/>
-                <a:cs typeface="Times New Roman"/>
-              </a:rPr>
-              <a:t>?</a:t>
-            </a:r>
-            <a:r>
-              <a:rPr lang="sv-SE" sz="1000">
-                <a:ea typeface="+mn-lt"/>
-                <a:cs typeface="+mn-lt"/>
-              </a:rPr>
-              <a:t>  </a:t>
-            </a:r>
+            <a:endParaRPr lang="sv-SE" sz="1000" dirty="0">
+              <a:ea typeface="Calibri" panose="020F0502020204030204"/>
+              <a:cs typeface="Calibri" panose="020F0502020204030204"/>
+            </a:endParaRPr>
+          </a:p>
+          <a:p>
+            <a:endParaRPr lang="sv-SE" sz="1000" dirty="0">
+              <a:ea typeface="Calibri" panose="020F0502020204030204"/>
+              <a:cs typeface="Calibri" panose="020F0502020204030204"/>
+            </a:endParaRPr>
+          </a:p>
+          <a:p>
+            <a:endParaRPr lang="sv-SE" sz="1000" dirty="0">
+              <a:ea typeface="Calibri" panose="020F0502020204030204"/>
+              <a:cs typeface="Calibri" panose="020F0502020204030204"/>
+            </a:endParaRPr>
+          </a:p>
+          <a:p>
+            <a:endParaRPr lang="sv-SE" sz="1000" dirty="0">
+              <a:ea typeface="Calibri" panose="020F0502020204030204"/>
+              <a:cs typeface="Calibri" panose="020F0502020204030204"/>
+            </a:endParaRPr>
+          </a:p>
+          <a:p>
+            <a:endParaRPr lang="sv-SE" sz="1000" dirty="0">
+              <a:ea typeface="Calibri" panose="020F0502020204030204"/>
+              <a:cs typeface="Calibri" panose="020F0502020204030204"/>
+            </a:endParaRPr>
+          </a:p>
+          <a:p>
+            <a:endParaRPr lang="sv-SE" sz="1000" dirty="0">
+              <a:ea typeface="Calibri" panose="020F0502020204030204"/>
+              <a:cs typeface="Calibri" panose="020F0502020204030204"/>
+            </a:endParaRPr>
+          </a:p>
+          <a:p>
+            <a:endParaRPr lang="sv-SE" sz="1000" dirty="0">
+              <a:ea typeface="Calibri" panose="020F0502020204030204"/>
+              <a:cs typeface="Calibri" panose="020F0502020204030204"/>
+            </a:endParaRPr>
+          </a:p>
+          <a:p>
+            <a:endParaRPr lang="sv-SE" sz="1000" dirty="0">
+              <a:ea typeface="Calibri" panose="020F0502020204030204"/>
+              <a:cs typeface="Calibri" panose="020F0502020204030204"/>
+            </a:endParaRPr>
+          </a:p>
+          <a:p>
+            <a:endParaRPr lang="sv-SE" sz="1000" dirty="0">
+              <a:ea typeface="Calibri" panose="020F0502020204030204"/>
+              <a:cs typeface="Calibri" panose="020F0502020204030204"/>
+            </a:endParaRPr>
+          </a:p>
+          <a:p>
+            <a:endParaRPr lang="sv-SE" sz="1000" dirty="0">
+              <a:ea typeface="Calibri" panose="020F0502020204030204"/>
+              <a:cs typeface="Calibri" panose="020F0502020204030204"/>
+            </a:endParaRPr>
+          </a:p>
+          <a:p>
+            <a:endParaRPr lang="sv-SE" sz="1000" dirty="0">
+              <a:ea typeface="Calibri" panose="020F0502020204030204"/>
+              <a:cs typeface="Calibri" panose="020F0502020204030204"/>
+            </a:endParaRPr>
+          </a:p>
+          <a:p>
+            <a:endParaRPr lang="sv-SE" sz="1000" dirty="0">
+              <a:ea typeface="Calibri" panose="020F0502020204030204"/>
+              <a:cs typeface="Calibri" panose="020F0502020204030204"/>
+            </a:endParaRPr>
+          </a:p>
+          <a:p>
+            <a:endParaRPr lang="sv-SE" sz="1000" dirty="0">
+              <a:ea typeface="Calibri" panose="020F0502020204030204"/>
+              <a:cs typeface="Calibri" panose="020F0502020204030204"/>
+            </a:endParaRPr>
+          </a:p>
+          <a:p>
+            <a:endParaRPr lang="sv-SE" sz="1000" dirty="0">
+              <a:ea typeface="Calibri" panose="020F0502020204030204"/>
+              <a:cs typeface="Calibri" panose="020F0502020204030204"/>
+            </a:endParaRPr>
+          </a:p>
+          <a:p>
+            <a:endParaRPr lang="sv-SE" sz="1000" dirty="0">
+              <a:ea typeface="Calibri" panose="020F0502020204030204"/>
+              <a:cs typeface="Calibri" panose="020F0502020204030204"/>
+            </a:endParaRPr>
+          </a:p>
+          <a:p>
+            <a:endParaRPr lang="sv-SE" sz="1000" dirty="0">
+              <a:ea typeface="Calibri" panose="020F0502020204030204"/>
+              <a:cs typeface="Calibri" panose="020F0502020204030204"/>
+            </a:endParaRPr>
+          </a:p>
+          <a:p>
+            <a:endParaRPr lang="sv-SE" sz="1000" dirty="0">
+              <a:ea typeface="Calibri" panose="020F0502020204030204"/>
+              <a:cs typeface="Calibri" panose="020F0502020204030204"/>
+            </a:endParaRPr>
+          </a:p>
+          <a:p>
+            <a:endParaRPr lang="sv-SE" sz="1000" dirty="0">
+              <a:ea typeface="Calibri" panose="020F0502020204030204"/>
+              <a:cs typeface="Calibri" panose="020F0502020204030204"/>
+            </a:endParaRPr>
+          </a:p>
+          <a:p>
+            <a:endParaRPr lang="sv-SE" sz="1000" dirty="0">
+              <a:ea typeface="Calibri" panose="020F0502020204030204"/>
+              <a:cs typeface="Calibri" panose="020F0502020204030204"/>
+            </a:endParaRPr>
+          </a:p>
+          <a:p>
+            <a:endParaRPr lang="sv-SE" sz="1000" dirty="0">
+              <a:ea typeface="Calibri" panose="020F0502020204030204"/>
+              <a:cs typeface="Calibri" panose="020F0502020204030204"/>
+            </a:endParaRPr>
+          </a:p>
+          <a:p>
+            <a:endParaRPr lang="sv-SE" sz="1000" dirty="0">
+              <a:ea typeface="Calibri" panose="020F0502020204030204"/>
+              <a:cs typeface="Calibri" panose="020F0502020204030204"/>
+            </a:endParaRPr>
+          </a:p>
+          <a:p>
+            <a:endParaRPr lang="sv-SE" sz="1000" dirty="0">
+              <a:ea typeface="Calibri" panose="020F0502020204030204"/>
+              <a:cs typeface="Calibri" panose="020F0502020204030204"/>
+            </a:endParaRPr>
+          </a:p>
+          <a:p>
+            <a:endParaRPr lang="sv-SE" sz="1000" dirty="0">
+              <a:ea typeface="Calibri" panose="020F0502020204030204"/>
+              <a:cs typeface="Calibri" panose="020F0502020204030204"/>
+            </a:endParaRPr>
+          </a:p>
+          <a:p>
+            <a:endParaRPr lang="sv-SE" sz="1000" dirty="0">
+              <a:ea typeface="Calibri" panose="020F0502020204030204"/>
+              <a:cs typeface="Calibri" panose="020F0502020204030204"/>
+            </a:endParaRPr>
+          </a:p>
+          <a:p>
+            <a:endParaRPr lang="sv-SE" sz="1000" dirty="0">
+              <a:ea typeface="Calibri" panose="020F0502020204030204"/>
+              <a:cs typeface="Calibri" panose="020F0502020204030204"/>
+            </a:endParaRPr>
+          </a:p>
+          <a:p>
+            <a:endParaRPr lang="sv-SE" sz="1000" dirty="0">
+              <a:ea typeface="Calibri" panose="020F0502020204030204"/>
+              <a:cs typeface="Calibri" panose="020F0502020204030204"/>
+            </a:endParaRPr>
+          </a:p>
+          <a:p>
+            <a:endParaRPr lang="sv-SE" sz="1000" dirty="0">
+              <a:ea typeface="Calibri" panose="020F0502020204030204"/>
+              <a:cs typeface="Calibri" panose="020F0502020204030204"/>
+            </a:endParaRPr>
+          </a:p>
+          <a:p>
+            <a:endParaRPr lang="sv-SE" sz="1000" dirty="0">
+              <a:ea typeface="Calibri" panose="020F0502020204030204"/>
+              <a:cs typeface="Calibri" panose="020F0502020204030204"/>
+            </a:endParaRPr>
+          </a:p>
+          <a:p>
+            <a:endParaRPr lang="sv-SE" sz="1000" dirty="0">
+              <a:ea typeface="Calibri" panose="020F0502020204030204"/>
+              <a:cs typeface="Calibri" panose="020F0502020204030204"/>
+            </a:endParaRPr>
+          </a:p>
+          <a:p>
+            <a:endParaRPr lang="sv-SE" sz="1000" dirty="0">
+              <a:ea typeface="Calibri" panose="020F0502020204030204"/>
+              <a:cs typeface="Calibri" panose="020F0502020204030204"/>
+            </a:endParaRPr>
+          </a:p>
+          <a:p>
+            <a:endParaRPr lang="sv-SE" sz="1000" dirty="0">
+              <a:ea typeface="Calibri" panose="020F0502020204030204"/>
+              <a:cs typeface="Calibri" panose="020F0502020204030204"/>
+            </a:endParaRPr>
+          </a:p>
+          <a:p>
+            <a:endParaRPr lang="sv-SE" sz="1000" dirty="0">
+              <a:ea typeface="Calibri" panose="020F0502020204030204"/>
+              <a:cs typeface="Calibri" panose="020F0502020204030204"/>
+            </a:endParaRPr>
+          </a:p>
+          <a:p>
+            <a:endParaRPr lang="sv-SE" sz="1000" dirty="0">
+              <a:ea typeface="Calibri" panose="020F0502020204030204"/>
+              <a:cs typeface="Calibri" panose="020F0502020204030204"/>
+            </a:endParaRPr>
           </a:p>
           <a:p>
             <a:pPr marL="285750" indent="-285750">
               <a:buFont typeface="Arial"/>
               <a:buChar char="•"/>
             </a:pPr>
-            <a:r>
-              <a:rPr lang="sv-SE" sz="1000" err="1">
-                <a:ea typeface="+mn-lt"/>
-                <a:cs typeface="+mn-lt"/>
-              </a:rPr>
-              <a:t>Which</a:t>
-            </a:r>
-            <a:r>
-              <a:rPr lang="sv-SE" sz="1000">
-                <a:ea typeface="+mn-lt"/>
-                <a:cs typeface="+mn-lt"/>
-              </a:rPr>
-              <a:t> </a:t>
-            </a:r>
-            <a:r>
-              <a:rPr lang="sv-SE" sz="1000" err="1">
-                <a:ea typeface="+mn-lt"/>
-                <a:cs typeface="+mn-lt"/>
-              </a:rPr>
-              <a:t>reporting</a:t>
-            </a:r>
-            <a:r>
-              <a:rPr lang="sv-SE" sz="1000">
-                <a:ea typeface="+mn-lt"/>
-                <a:cs typeface="+mn-lt"/>
-              </a:rPr>
-              <a:t> standard </a:t>
-            </a:r>
-            <a:r>
-              <a:rPr lang="sv-SE" sz="1000" err="1">
-                <a:ea typeface="+mn-lt"/>
-                <a:cs typeface="+mn-lt"/>
-              </a:rPr>
-              <a:t>are</a:t>
-            </a:r>
-            <a:r>
-              <a:rPr lang="sv-SE" sz="1000">
-                <a:ea typeface="+mn-lt"/>
-                <a:cs typeface="+mn-lt"/>
-              </a:rPr>
-              <a:t> </a:t>
-            </a:r>
-            <a:r>
-              <a:rPr lang="sv-SE" sz="1000" err="1">
-                <a:ea typeface="+mn-lt"/>
-                <a:cs typeface="+mn-lt"/>
-              </a:rPr>
-              <a:t>they</a:t>
-            </a:r>
-            <a:r>
-              <a:rPr lang="sv-SE" sz="1000">
-                <a:ea typeface="+mn-lt"/>
-                <a:cs typeface="+mn-lt"/>
-              </a:rPr>
-              <a:t> </a:t>
-            </a:r>
-            <a:r>
-              <a:rPr lang="sv-SE" sz="1000" err="1">
-                <a:ea typeface="+mn-lt"/>
-                <a:cs typeface="+mn-lt"/>
-              </a:rPr>
-              <a:t>using</a:t>
-            </a:r>
-            <a:r>
-              <a:rPr lang="sv-SE" sz="1000">
-                <a:ea typeface="+mn-lt"/>
-                <a:cs typeface="+mn-lt"/>
-              </a:rPr>
-              <a:t>?</a:t>
-            </a:r>
-            <a:r>
-              <a:rPr lang="sv-SE" sz="1000">
-                <a:latin typeface="Times New Roman"/>
-                <a:cs typeface="Times New Roman"/>
-              </a:rPr>
-              <a:t> (Does </a:t>
-            </a:r>
-            <a:r>
-              <a:rPr lang="sv-SE" sz="1000" err="1">
-                <a:latin typeface="Times New Roman"/>
-                <a:cs typeface="Times New Roman"/>
-              </a:rPr>
-              <a:t>every</a:t>
-            </a:r>
-            <a:r>
-              <a:rPr lang="sv-SE" sz="1000">
-                <a:latin typeface="Times New Roman"/>
-                <a:cs typeface="Times New Roman"/>
-              </a:rPr>
-              <a:t> </a:t>
-            </a:r>
-            <a:r>
-              <a:rPr lang="sv-SE" sz="1000" err="1">
-                <a:latin typeface="Times New Roman"/>
-                <a:cs typeface="Times New Roman"/>
-              </a:rPr>
-              <a:t>company</a:t>
-            </a:r>
-            <a:r>
-              <a:rPr lang="sv-SE" sz="1000">
-                <a:latin typeface="Times New Roman"/>
-                <a:cs typeface="Times New Roman"/>
-              </a:rPr>
-              <a:t> </a:t>
-            </a:r>
-            <a:r>
-              <a:rPr lang="sv-SE" sz="1000" err="1">
-                <a:latin typeface="Times New Roman"/>
-                <a:cs typeface="Times New Roman"/>
-              </a:rPr>
-              <a:t>use</a:t>
-            </a:r>
-            <a:r>
-              <a:rPr lang="sv-SE" sz="1000">
-                <a:latin typeface="Times New Roman"/>
-                <a:cs typeface="Times New Roman"/>
-              </a:rPr>
-              <a:t> GRI?)</a:t>
-            </a:r>
-            <a:r>
-              <a:rPr lang="sv-SE" sz="1000">
-                <a:ea typeface="+mn-lt"/>
-                <a:cs typeface="+mn-lt"/>
-              </a:rPr>
-              <a:t>  </a:t>
-            </a:r>
-          </a:p>
-          <a:p>
-            <a:pPr marL="285750" indent="-285750">
-              <a:buFont typeface="Arial"/>
-              <a:buChar char="•"/>
-            </a:pPr>
-            <a:r>
-              <a:rPr lang="sv-SE" sz="1000" i="1" err="1">
-                <a:ea typeface="+mn-lt"/>
-                <a:cs typeface="+mn-lt"/>
-              </a:rPr>
-              <a:t>Their</a:t>
-            </a:r>
-            <a:r>
-              <a:rPr lang="sv-SE" sz="1000" i="1">
-                <a:ea typeface="+mn-lt"/>
-                <a:cs typeface="+mn-lt"/>
-              </a:rPr>
-              <a:t> </a:t>
-            </a:r>
-            <a:r>
-              <a:rPr lang="sv-SE" sz="1000" i="1" err="1">
-                <a:ea typeface="+mn-lt"/>
-                <a:cs typeface="+mn-lt"/>
-              </a:rPr>
-              <a:t>Carbon</a:t>
-            </a:r>
-            <a:r>
-              <a:rPr lang="sv-SE" sz="1000" i="1">
-                <a:ea typeface="+mn-lt"/>
-                <a:cs typeface="+mn-lt"/>
-              </a:rPr>
-              <a:t> </a:t>
-            </a:r>
-            <a:r>
-              <a:rPr lang="sv-SE" sz="1000" i="1" err="1">
-                <a:ea typeface="+mn-lt"/>
-                <a:cs typeface="+mn-lt"/>
-              </a:rPr>
-              <a:t>Disclosure</a:t>
-            </a:r>
-            <a:r>
-              <a:rPr lang="sv-SE" sz="1000" i="1">
-                <a:ea typeface="+mn-lt"/>
-                <a:cs typeface="+mn-lt"/>
-              </a:rPr>
-              <a:t> Project score is A-</a:t>
-            </a:r>
-            <a:r>
-              <a:rPr lang="sv-SE" sz="1000">
-                <a:ea typeface="+mn-lt"/>
-                <a:cs typeface="+mn-lt"/>
-              </a:rPr>
-              <a:t> </a:t>
-            </a:r>
-          </a:p>
-          <a:p>
-            <a:pPr marL="285750" indent="-285750">
-              <a:buFont typeface="Arial"/>
-              <a:buChar char="•"/>
-            </a:pPr>
-            <a:endParaRPr lang="sv-SE" sz="1000">
-              <a:ea typeface="Calibri" panose="020F0502020204030204"/>
-              <a:cs typeface="Calibri" panose="020F0502020204030204"/>
-            </a:endParaRPr>
-          </a:p>
-          <a:p>
-            <a:pPr marL="285750" indent="-285750">
-              <a:buFont typeface="Arial"/>
-              <a:buChar char="•"/>
-            </a:pPr>
-            <a:endParaRPr lang="sv-SE" sz="1000">
-              <a:ea typeface="Calibri" panose="020F0502020204030204"/>
-              <a:cs typeface="Calibri" panose="020F0502020204030204"/>
-            </a:endParaRPr>
-          </a:p>
-          <a:p>
-            <a:pPr marL="285750" indent="-285750">
-              <a:buFont typeface="Arial"/>
-              <a:buChar char="•"/>
-            </a:pPr>
-            <a:endParaRPr lang="sv-SE" sz="1000">
-              <a:ea typeface="Calibri" panose="020F0502020204030204"/>
-              <a:cs typeface="Calibri" panose="020F0502020204030204"/>
-            </a:endParaRPr>
-          </a:p>
-          <a:p>
-            <a:pPr marL="285750" indent="-285750">
-              <a:buFont typeface="Arial"/>
-              <a:buChar char="•"/>
-            </a:pPr>
-            <a:endParaRPr lang="sv-SE" sz="1000">
-              <a:ea typeface="Calibri" panose="020F0502020204030204"/>
-              <a:cs typeface="Calibri" panose="020F0502020204030204"/>
-            </a:endParaRPr>
-          </a:p>
-          <a:p>
-            <a:pPr marL="285750" indent="-285750">
-              <a:buFont typeface="Arial"/>
-              <a:buChar char="•"/>
-            </a:pPr>
-            <a:endParaRPr lang="sv-SE" sz="1000">
-              <a:ea typeface="Calibri" panose="020F0502020204030204"/>
-              <a:cs typeface="Calibri" panose="020F0502020204030204"/>
-            </a:endParaRPr>
-          </a:p>
-          <a:p>
-            <a:pPr marL="285750" indent="-285750">
-              <a:buFont typeface="Arial"/>
-              <a:buChar char="•"/>
-            </a:pPr>
-            <a:endParaRPr lang="sv-SE" sz="1000">
+            <a:endParaRPr lang="sv-SE" sz="1000" dirty="0">
               <a:ea typeface="Calibri" panose="020F0502020204030204"/>
               <a:cs typeface="Calibri" panose="020F0502020204030204"/>
             </a:endParaRPr>
@@ -8057,7 +6838,7 @@
         </p:sp>
         <p:sp>
           <p:nvSpPr>
-            <p:cNvPr id="2" name="TextBox 1">
+            <p:cNvPr id="2" name="EmissionManagement">
               <a:extLst>
                 <a:ext uri="{FF2B5EF4-FFF2-40B4-BE49-F238E27FC236}">
                   <a16:creationId xmlns:a16="http://schemas.microsoft.com/office/drawing/2014/main" id="{9B542F04-3245-83B2-1CF1-EF062922034F}"/>
@@ -8098,10 +6879,6 @@
               </a:r>
             </a:p>
             <a:p>
-              <a:pPr marL="285750" indent="-285750">
-                <a:buFont typeface="Arial"/>
-                <a:buChar char="•"/>
-              </a:pPr>
               <a:r>
                 <a:rPr lang="en-US" sz="1000" b="0" i="1" dirty="0">
                   <a:solidFill>
@@ -8185,7 +6962,7 @@
         </p:sp>
         <p:sp>
           <p:nvSpPr>
-            <p:cNvPr id="3" name="TextBox 2">
+            <p:cNvPr id="3" name="ResourcesManagement">
               <a:extLst>
                 <a:ext uri="{FF2B5EF4-FFF2-40B4-BE49-F238E27FC236}">
                   <a16:creationId xmlns:a16="http://schemas.microsoft.com/office/drawing/2014/main" id="{68188345-DAD2-0F54-EC92-CE1E36B55603}"/>
@@ -8231,10 +7008,6 @@
               </a:endParaRPr>
             </a:p>
             <a:p>
-              <a:pPr marL="285750" indent="-285750">
-                <a:buFont typeface="Arial"/>
-                <a:buChar char="•"/>
-              </a:pPr>
               <a:r>
                 <a:rPr lang="en-US" sz="1000" i="1" dirty="0">
                   <a:solidFill>
@@ -8271,7 +7044,7 @@
         </p:sp>
         <p:sp>
           <p:nvSpPr>
-            <p:cNvPr id="4" name="TextBox 3">
+            <p:cNvPr id="4" name="WasteManagement">
               <a:extLst>
                 <a:ext uri="{FF2B5EF4-FFF2-40B4-BE49-F238E27FC236}">
                   <a16:creationId xmlns:a16="http://schemas.microsoft.com/office/drawing/2014/main" id="{DA3F3E79-8D77-FC87-A734-4E09595CB5DF}"/>
@@ -8321,10 +7094,7 @@
               </a:endParaRPr>
             </a:p>
             <a:p>
-              <a:pPr fontAlgn="base">
-                <a:buFont typeface="Arial" panose="020B0604020202020204" pitchFamily="34" charset="0"/>
-                <a:buChar char="•"/>
-              </a:pPr>
+              <a:pPr fontAlgn="base"/>
               <a:r>
                 <a:rPr lang="en-US" sz="1000" i="1" dirty="0">
                   <a:solidFill>
@@ -8362,7 +7132,7 @@
       </p:grpSp>
       <p:pic>
         <p:nvPicPr>
-          <p:cNvPr id="6" name="Graphic 5">
+          <p:cNvPr id="6" name="Logo">
             <a:extLst>
               <a:ext uri="{FF2B5EF4-FFF2-40B4-BE49-F238E27FC236}">
                 <a16:creationId xmlns:a16="http://schemas.microsoft.com/office/drawing/2014/main" id="{507A67E8-0854-3AB2-7D14-E5C7EAFDB726}"/>
@@ -8390,6 +7160,30 @@
           <a:xfrm>
             <a:off x="212367" y="242149"/>
             <a:ext cx="723900" cy="542925"/>
+          </a:xfrm>
+          <a:prstGeom prst="rect">
+            <a:avLst/>
+          </a:prstGeom>
+        </p:spPr>
+      </p:pic>
+      <p:pic>
+        <p:nvPicPr>
+          <p:cNvPr id="29" name="Picture 28" descr="Wooper.png"/>
+          <p:cNvPicPr>
+            <a:picLocks noChangeAspect="1"/>
+          </p:cNvPicPr>
+          <p:nvPr/>
+        </p:nvPicPr>
+        <p:blipFill>
+          <a:blip r:embed="rId5"/>
+          <a:stretch>
+            <a:fillRect/>
+          </a:stretch>
+        </p:blipFill>
+        <p:spPr>
+          <a:xfrm>
+            <a:off x="137160" y="210312"/>
+            <a:ext cx="914400" cy="640080"/>
           </a:xfrm>
           <a:prstGeom prst="rect">
             <a:avLst/>
@@ -9000,15 +7794,6 @@
 </file>
 
 <file path=customXml/item1.xml><?xml version="1.0" encoding="utf-8"?>
-<?mso-contentType ?>
-<FormTemplates xmlns="http://schemas.microsoft.com/sharepoint/v3/contenttype/forms">
-  <Display>DocumentLibraryForm</Display>
-  <Edit>DocumentLibraryForm</Edit>
-  <New>DocumentLibraryForm</New>
-</FormTemplates>
-</file>
-
-<file path=customXml/item2.xml><?xml version="1.0" encoding="utf-8"?>
 <p:properties xmlns:p="http://schemas.microsoft.com/office/2006/metadata/properties" xmlns:xsi="http://www.w3.org/2001/XMLSchema-instance" xmlns:pc="http://schemas.microsoft.com/office/infopath/2007/PartnerControls">
   <documentManagement>
     <TaxCatchAll xmlns="fa0e144d-b21d-458c-9998-1dd40bb68d67" xsi:nil="true"/>
@@ -9017,6 +7802,15 @@
     </lcf76f155ced4ddcb4097134ff3c332f>
   </documentManagement>
 </p:properties>
+</file>
+
+<file path=customXml/item2.xml><?xml version="1.0" encoding="utf-8"?>
+<?mso-contentType ?>
+<FormTemplates xmlns="http://schemas.microsoft.com/sharepoint/v3/contenttype/forms">
+  <Display>DocumentLibraryForm</Display>
+  <Edit>DocumentLibraryForm</Edit>
+  <New>DocumentLibraryForm</New>
+</FormTemplates>
 </file>
 
 <file path=customXml/item3.xml><?xml version="1.0" encoding="utf-8"?>
@@ -9203,14 +7997,6 @@
 </file>
 
 <file path=customXml/itemProps1.xml><?xml version="1.0" encoding="utf-8"?>
-<ds:datastoreItem xmlns:ds="http://schemas.openxmlformats.org/officeDocument/2006/customXml" ds:itemID="{A5D5FD53-76C5-4FB4-A052-D68EA4C12473}">
-  <ds:schemaRefs>
-    <ds:schemaRef ds:uri="http://schemas.microsoft.com/sharepoint/v3/contenttype/forms"/>
-  </ds:schemaRefs>
-</ds:datastoreItem>
-</file>
-
-<file path=customXml/itemProps2.xml><?xml version="1.0" encoding="utf-8"?>
 <ds:datastoreItem xmlns:ds="http://schemas.openxmlformats.org/officeDocument/2006/customXml" ds:itemID="{8CA72921-643F-4F23-9371-405429FFA248}">
   <ds:schemaRefs>
     <ds:schemaRef ds:uri="08f65f34-dad4-417d-8d65-05140976dab1"/>
@@ -9223,6 +8009,14 @@
     <ds:schemaRef ds:uri="http://schemas.microsoft.com/office/infopath/2007/PartnerControls"/>
     <ds:schemaRef ds:uri="http://schemas.openxmlformats.org/package/2006/metadata/core-properties"/>
     <ds:schemaRef ds:uri="http://www.w3.org/XML/1998/namespace"/>
+  </ds:schemaRefs>
+</ds:datastoreItem>
+</file>
+
+<file path=customXml/itemProps2.xml><?xml version="1.0" encoding="utf-8"?>
+<ds:datastoreItem xmlns:ds="http://schemas.openxmlformats.org/officeDocument/2006/customXml" ds:itemID="{A5D5FD53-76C5-4FB4-A052-D68EA4C12473}">
+  <ds:schemaRefs>
+    <ds:schemaRef ds:uri="http://schemas.microsoft.com/sharepoint/v3/contenttype/forms"/>
   </ds:schemaRefs>
 </ds:datastoreItem>
 </file>

</xml_diff>